<commit_message>
Create new designs for menu and display panel
</commit_message>
<xml_diff>
--- a/docu/EHCP Portal.pptx
+++ b/docu/EHCP Portal.pptx
@@ -11,7 +11,8 @@
     <p:sldId id="259" r:id="rId5"/>
     <p:sldId id="260" r:id="rId6"/>
     <p:sldId id="261" r:id="rId7"/>
-    <p:sldId id="262" r:id="rId8"/>
+    <p:sldId id="263" r:id="rId8"/>
+    <p:sldId id="264" r:id="rId9"/>
   </p:sldIdLst>
   <p:sldSz cx="12192000" cy="6858000"/>
   <p:notesSz cx="6858000" cy="9144000"/>
@@ -267,7 +268,7 @@
           <a:p>
             <a:fld id="{E505CE64-9815-47B7-979A-6D8019E96A87}" type="datetimeFigureOut">
               <a:rPr lang="en-PH" smtClean="0"/>
-              <a:t>20/07/2020</a:t>
+              <a:t>24/07/2020</a:t>
             </a:fld>
             <a:endParaRPr lang="en-PH"/>
           </a:p>
@@ -467,7 +468,7 @@
           <a:p>
             <a:fld id="{E505CE64-9815-47B7-979A-6D8019E96A87}" type="datetimeFigureOut">
               <a:rPr lang="en-PH" smtClean="0"/>
-              <a:t>20/07/2020</a:t>
+              <a:t>24/07/2020</a:t>
             </a:fld>
             <a:endParaRPr lang="en-PH"/>
           </a:p>
@@ -677,7 +678,7 @@
           <a:p>
             <a:fld id="{E505CE64-9815-47B7-979A-6D8019E96A87}" type="datetimeFigureOut">
               <a:rPr lang="en-PH" smtClean="0"/>
-              <a:t>20/07/2020</a:t>
+              <a:t>24/07/2020</a:t>
             </a:fld>
             <a:endParaRPr lang="en-PH"/>
           </a:p>
@@ -877,7 +878,7 @@
           <a:p>
             <a:fld id="{E505CE64-9815-47B7-979A-6D8019E96A87}" type="datetimeFigureOut">
               <a:rPr lang="en-PH" smtClean="0"/>
-              <a:t>20/07/2020</a:t>
+              <a:t>24/07/2020</a:t>
             </a:fld>
             <a:endParaRPr lang="en-PH"/>
           </a:p>
@@ -1153,7 +1154,7 @@
           <a:p>
             <a:fld id="{E505CE64-9815-47B7-979A-6D8019E96A87}" type="datetimeFigureOut">
               <a:rPr lang="en-PH" smtClean="0"/>
-              <a:t>20/07/2020</a:t>
+              <a:t>24/07/2020</a:t>
             </a:fld>
             <a:endParaRPr lang="en-PH"/>
           </a:p>
@@ -1421,7 +1422,7 @@
           <a:p>
             <a:fld id="{E505CE64-9815-47B7-979A-6D8019E96A87}" type="datetimeFigureOut">
               <a:rPr lang="en-PH" smtClean="0"/>
-              <a:t>20/07/2020</a:t>
+              <a:t>24/07/2020</a:t>
             </a:fld>
             <a:endParaRPr lang="en-PH"/>
           </a:p>
@@ -1836,7 +1837,7 @@
           <a:p>
             <a:fld id="{E505CE64-9815-47B7-979A-6D8019E96A87}" type="datetimeFigureOut">
               <a:rPr lang="en-PH" smtClean="0"/>
-              <a:t>20/07/2020</a:t>
+              <a:t>24/07/2020</a:t>
             </a:fld>
             <a:endParaRPr lang="en-PH"/>
           </a:p>
@@ -1978,7 +1979,7 @@
           <a:p>
             <a:fld id="{E505CE64-9815-47B7-979A-6D8019E96A87}" type="datetimeFigureOut">
               <a:rPr lang="en-PH" smtClean="0"/>
-              <a:t>20/07/2020</a:t>
+              <a:t>24/07/2020</a:t>
             </a:fld>
             <a:endParaRPr lang="en-PH"/>
           </a:p>
@@ -2091,7 +2092,7 @@
           <a:p>
             <a:fld id="{E505CE64-9815-47B7-979A-6D8019E96A87}" type="datetimeFigureOut">
               <a:rPr lang="en-PH" smtClean="0"/>
-              <a:t>20/07/2020</a:t>
+              <a:t>24/07/2020</a:t>
             </a:fld>
             <a:endParaRPr lang="en-PH"/>
           </a:p>
@@ -2404,7 +2405,7 @@
           <a:p>
             <a:fld id="{E505CE64-9815-47B7-979A-6D8019E96A87}" type="datetimeFigureOut">
               <a:rPr lang="en-PH" smtClean="0"/>
-              <a:t>20/07/2020</a:t>
+              <a:t>24/07/2020</a:t>
             </a:fld>
             <a:endParaRPr lang="en-PH"/>
           </a:p>
@@ -2693,7 +2694,7 @@
           <a:p>
             <a:fld id="{E505CE64-9815-47B7-979A-6D8019E96A87}" type="datetimeFigureOut">
               <a:rPr lang="en-PH" smtClean="0"/>
-              <a:t>20/07/2020</a:t>
+              <a:t>24/07/2020</a:t>
             </a:fld>
             <a:endParaRPr lang="en-PH"/>
           </a:p>
@@ -2936,7 +2937,7 @@
           <a:p>
             <a:fld id="{E505CE64-9815-47B7-979A-6D8019E96A87}" type="datetimeFigureOut">
               <a:rPr lang="en-PH" smtClean="0"/>
-              <a:t>20/07/2020</a:t>
+              <a:t>24/07/2020</a:t>
             </a:fld>
             <a:endParaRPr lang="en-PH"/>
           </a:p>
@@ -3961,66 +3962,2576 @@
             <p:ph type="title"/>
           </p:nvPr>
         </p:nvSpPr>
-        <p:spPr/>
+        <p:spPr>
+          <a:xfrm>
+            <a:off x="838200" y="313392"/>
+            <a:ext cx="10515600" cy="1325563"/>
+          </a:xfrm>
+        </p:spPr>
         <p:txBody>
           <a:bodyPr/>
           <a:lstStyle/>
           <a:p>
             <a:r>
               <a:rPr lang="en-PH" dirty="0"/>
-              <a:t>To Do</a:t>
-            </a:r>
-          </a:p>
-        </p:txBody>
-      </p:sp>
-      <p:sp>
-        <p:nvSpPr>
-          <p:cNvPr id="3" name="Content Placeholder 2">
-            <a:extLst>
-              <a:ext uri="{FF2B5EF4-FFF2-40B4-BE49-F238E27FC236}">
-                <a16:creationId xmlns:a16="http://schemas.microsoft.com/office/drawing/2014/main" id="{291163C7-E09D-45A3-B0D8-394DC65B6C6F}"/>
-              </a:ext>
-            </a:extLst>
-          </p:cNvPr>
-          <p:cNvSpPr>
-            <a:spLocks noGrp="1"/>
-          </p:cNvSpPr>
-          <p:nvPr>
-            <p:ph idx="1"/>
-          </p:nvPr>
-        </p:nvSpPr>
-        <p:spPr/>
-        <p:txBody>
-          <a:bodyPr/>
-          <a:lstStyle/>
-          <a:p>
-            <a:r>
-              <a:rPr lang="en-PH" dirty="0"/>
-              <a:t>Design </a:t>
-            </a:r>
-            <a:r>
-              <a:rPr lang="en-PH"/>
-              <a:t>of database</a:t>
-            </a:r>
-          </a:p>
-          <a:p>
+              <a:t>Design</a:t>
+            </a:r>
+          </a:p>
+        </p:txBody>
+      </p:sp>
+      <p:sp>
+        <p:nvSpPr>
+          <p:cNvPr id="6" name="Rectangle 5">
+            <a:extLst>
+              <a:ext uri="{FF2B5EF4-FFF2-40B4-BE49-F238E27FC236}">
+                <a16:creationId xmlns:a16="http://schemas.microsoft.com/office/drawing/2014/main" id="{0F417E88-3CB5-4C6B-9EFB-A37A343C33D6}"/>
+              </a:ext>
+            </a:extLst>
+          </p:cNvPr>
+          <p:cNvSpPr/>
+          <p:nvPr/>
+        </p:nvSpPr>
+        <p:spPr>
+          <a:xfrm>
+            <a:off x="3367083" y="1362075"/>
+            <a:ext cx="7177091" cy="5130800"/>
+          </a:xfrm>
+          <a:prstGeom prst="rect">
+            <a:avLst/>
+          </a:prstGeom>
+          <a:solidFill>
+            <a:schemeClr val="bg1">
+              <a:lumMod val="95000"/>
+            </a:schemeClr>
+          </a:solidFill>
+          <a:ln>
+            <a:solidFill>
+              <a:schemeClr val="tx1"/>
+            </a:solidFill>
+          </a:ln>
+        </p:spPr>
+        <p:style>
+          <a:lnRef idx="2">
+            <a:schemeClr val="accent1">
+              <a:shade val="50000"/>
+            </a:schemeClr>
+          </a:lnRef>
+          <a:fillRef idx="1">
+            <a:schemeClr val="accent1"/>
+          </a:fillRef>
+          <a:effectRef idx="0">
+            <a:schemeClr val="accent1"/>
+          </a:effectRef>
+          <a:fontRef idx="minor">
+            <a:schemeClr val="lt1"/>
+          </a:fontRef>
+        </p:style>
+        <p:txBody>
+          <a:bodyPr rtlCol="0" anchor="ctr"/>
+          <a:lstStyle/>
+          <a:p>
+            <a:pPr algn="ctr"/>
+            <a:endParaRPr lang="en-PH" dirty="0">
+              <a:solidFill>
+                <a:schemeClr val="tx1"/>
+              </a:solidFill>
+            </a:endParaRPr>
+          </a:p>
+        </p:txBody>
+      </p:sp>
+      <p:sp>
+        <p:nvSpPr>
+          <p:cNvPr id="7" name="Rectangle 6">
+            <a:extLst>
+              <a:ext uri="{FF2B5EF4-FFF2-40B4-BE49-F238E27FC236}">
+                <a16:creationId xmlns:a16="http://schemas.microsoft.com/office/drawing/2014/main" id="{E0B1673C-F92B-4597-85A0-F12D766943FE}"/>
+              </a:ext>
+            </a:extLst>
+          </p:cNvPr>
+          <p:cNvSpPr/>
+          <p:nvPr/>
+        </p:nvSpPr>
+        <p:spPr>
+          <a:xfrm>
+            <a:off x="1343024" y="1362074"/>
+            <a:ext cx="2028825" cy="5130799"/>
+          </a:xfrm>
+          <a:prstGeom prst="rect">
+            <a:avLst/>
+          </a:prstGeom>
+          <a:solidFill>
+            <a:srgbClr val="92D050"/>
+          </a:solidFill>
+        </p:spPr>
+        <p:style>
+          <a:lnRef idx="2">
+            <a:schemeClr val="accent1">
+              <a:shade val="50000"/>
+            </a:schemeClr>
+          </a:lnRef>
+          <a:fillRef idx="1">
+            <a:schemeClr val="accent1"/>
+          </a:fillRef>
+          <a:effectRef idx="0">
+            <a:schemeClr val="accent1"/>
+          </a:effectRef>
+          <a:fontRef idx="minor">
+            <a:schemeClr val="lt1"/>
+          </a:fontRef>
+        </p:style>
+        <p:txBody>
+          <a:bodyPr rtlCol="0" anchor="ctr"/>
+          <a:lstStyle/>
+          <a:p>
+            <a:pPr algn="ctr"/>
             <a:endParaRPr lang="en-PH" dirty="0"/>
           </a:p>
-          <a:p>
-            <a:endParaRPr lang="en-PH" dirty="0"/>
-          </a:p>
-          <a:p>
-            <a:endParaRPr lang="en-PH" dirty="0"/>
-          </a:p>
-          <a:p>
-            <a:endParaRPr lang="en-PH" dirty="0"/>
+        </p:txBody>
+      </p:sp>
+      <p:sp>
+        <p:nvSpPr>
+          <p:cNvPr id="8" name="Rectangle: Rounded Corners 7">
+            <a:extLst>
+              <a:ext uri="{FF2B5EF4-FFF2-40B4-BE49-F238E27FC236}">
+                <a16:creationId xmlns:a16="http://schemas.microsoft.com/office/drawing/2014/main" id="{F98FA218-AD24-40CF-ACDC-BBFA6A4555DA}"/>
+              </a:ext>
+            </a:extLst>
+          </p:cNvPr>
+          <p:cNvSpPr/>
+          <p:nvPr/>
+        </p:nvSpPr>
+        <p:spPr>
+          <a:xfrm>
+            <a:off x="1512092" y="2508111"/>
+            <a:ext cx="1690688" cy="323851"/>
+          </a:xfrm>
+          <a:prstGeom prst="roundRect">
+            <a:avLst/>
+          </a:prstGeom>
+          <a:solidFill>
+            <a:schemeClr val="accent6">
+              <a:lumMod val="75000"/>
+            </a:schemeClr>
+          </a:solidFill>
+        </p:spPr>
+        <p:style>
+          <a:lnRef idx="2">
+            <a:schemeClr val="accent1">
+              <a:shade val="50000"/>
+            </a:schemeClr>
+          </a:lnRef>
+          <a:fillRef idx="1">
+            <a:schemeClr val="accent1"/>
+          </a:fillRef>
+          <a:effectRef idx="0">
+            <a:schemeClr val="accent1"/>
+          </a:effectRef>
+          <a:fontRef idx="minor">
+            <a:schemeClr val="lt1"/>
+          </a:fontRef>
+        </p:style>
+        <p:txBody>
+          <a:bodyPr rtlCol="0" anchor="ctr"/>
+          <a:lstStyle/>
+          <a:p>
+            <a:pPr algn="ctr"/>
+            <a:r>
+              <a:rPr lang="en-PH" sz="1400" dirty="0">
+                <a:solidFill>
+                  <a:schemeClr val="bg1">
+                    <a:lumMod val="95000"/>
+                  </a:schemeClr>
+                </a:solidFill>
+              </a:rPr>
+              <a:t>Contacts</a:t>
+            </a:r>
+          </a:p>
+        </p:txBody>
+      </p:sp>
+      <p:sp>
+        <p:nvSpPr>
+          <p:cNvPr id="9" name="Rectangle: Rounded Corners 8">
+            <a:extLst>
+              <a:ext uri="{FF2B5EF4-FFF2-40B4-BE49-F238E27FC236}">
+                <a16:creationId xmlns:a16="http://schemas.microsoft.com/office/drawing/2014/main" id="{FF1DB019-DD0F-49C9-B305-9245CE4C5EBA}"/>
+              </a:ext>
+            </a:extLst>
+          </p:cNvPr>
+          <p:cNvSpPr/>
+          <p:nvPr/>
+        </p:nvSpPr>
+        <p:spPr>
+          <a:xfrm>
+            <a:off x="1509710" y="2914180"/>
+            <a:ext cx="1690688" cy="323852"/>
+          </a:xfrm>
+          <a:prstGeom prst="roundRect">
+            <a:avLst/>
+          </a:prstGeom>
+          <a:solidFill>
+            <a:schemeClr val="accent6">
+              <a:lumMod val="20000"/>
+              <a:lumOff val="80000"/>
+            </a:schemeClr>
+          </a:solidFill>
+        </p:spPr>
+        <p:style>
+          <a:lnRef idx="2">
+            <a:schemeClr val="accent1">
+              <a:shade val="50000"/>
+            </a:schemeClr>
+          </a:lnRef>
+          <a:fillRef idx="1">
+            <a:schemeClr val="accent1"/>
+          </a:fillRef>
+          <a:effectRef idx="0">
+            <a:schemeClr val="accent1"/>
+          </a:effectRef>
+          <a:fontRef idx="minor">
+            <a:schemeClr val="lt1"/>
+          </a:fontRef>
+        </p:style>
+        <p:txBody>
+          <a:bodyPr rtlCol="0" anchor="ctr"/>
+          <a:lstStyle/>
+          <a:p>
+            <a:pPr algn="ctr"/>
+            <a:r>
+              <a:rPr lang="en-PH" sz="1400" dirty="0">
+                <a:solidFill>
+                  <a:sysClr val="windowText" lastClr="000000"/>
+                </a:solidFill>
+              </a:rPr>
+              <a:t>Distribution</a:t>
+            </a:r>
+          </a:p>
+        </p:txBody>
+      </p:sp>
+      <p:sp>
+        <p:nvSpPr>
+          <p:cNvPr id="10" name="Rectangle: Rounded Corners 9">
+            <a:extLst>
+              <a:ext uri="{FF2B5EF4-FFF2-40B4-BE49-F238E27FC236}">
+                <a16:creationId xmlns:a16="http://schemas.microsoft.com/office/drawing/2014/main" id="{8F08CE64-735E-47B1-8A56-056AE563E142}"/>
+              </a:ext>
+            </a:extLst>
+          </p:cNvPr>
+          <p:cNvSpPr/>
+          <p:nvPr/>
+        </p:nvSpPr>
+        <p:spPr>
+          <a:xfrm>
+            <a:off x="1509710" y="3318993"/>
+            <a:ext cx="1690688" cy="323852"/>
+          </a:xfrm>
+          <a:prstGeom prst="roundRect">
+            <a:avLst/>
+          </a:prstGeom>
+          <a:solidFill>
+            <a:schemeClr val="accent6">
+              <a:lumMod val="20000"/>
+              <a:lumOff val="80000"/>
+            </a:schemeClr>
+          </a:solidFill>
+        </p:spPr>
+        <p:style>
+          <a:lnRef idx="2">
+            <a:schemeClr val="accent1">
+              <a:shade val="50000"/>
+            </a:schemeClr>
+          </a:lnRef>
+          <a:fillRef idx="1">
+            <a:schemeClr val="accent1"/>
+          </a:fillRef>
+          <a:effectRef idx="0">
+            <a:schemeClr val="accent1"/>
+          </a:effectRef>
+          <a:fontRef idx="minor">
+            <a:schemeClr val="lt1"/>
+          </a:fontRef>
+        </p:style>
+        <p:txBody>
+          <a:bodyPr rtlCol="0" anchor="ctr"/>
+          <a:lstStyle/>
+          <a:p>
+            <a:pPr algn="ctr"/>
+            <a:r>
+              <a:rPr lang="en-PH" sz="1400" dirty="0">
+                <a:solidFill>
+                  <a:sysClr val="windowText" lastClr="000000"/>
+                </a:solidFill>
+              </a:rPr>
+              <a:t>Events</a:t>
+            </a:r>
+          </a:p>
+        </p:txBody>
+      </p:sp>
+      <p:sp>
+        <p:nvSpPr>
+          <p:cNvPr id="11" name="TextBox 10">
+            <a:extLst>
+              <a:ext uri="{FF2B5EF4-FFF2-40B4-BE49-F238E27FC236}">
+                <a16:creationId xmlns:a16="http://schemas.microsoft.com/office/drawing/2014/main" id="{F2599194-867C-4499-A9BB-8AEEDEB055C6}"/>
+              </a:ext>
+            </a:extLst>
+          </p:cNvPr>
+          <p:cNvSpPr txBox="1"/>
+          <p:nvPr/>
+        </p:nvSpPr>
+        <p:spPr>
+          <a:xfrm>
+            <a:off x="1512092" y="1581150"/>
+            <a:ext cx="1690688" cy="707886"/>
+          </a:xfrm>
+          <a:prstGeom prst="rect">
+            <a:avLst/>
+          </a:prstGeom>
+          <a:noFill/>
+        </p:spPr>
+        <p:txBody>
+          <a:bodyPr wrap="square" rtlCol="0">
+            <a:spAutoFit/>
+          </a:bodyPr>
+          <a:lstStyle/>
+          <a:p>
+            <a:pPr algn="ctr"/>
+            <a:r>
+              <a:rPr lang="en-PH" sz="2000" b="1" dirty="0">
+                <a:latin typeface="Arial Black" panose="020B0A04020102020204" pitchFamily="34" charset="0"/>
+              </a:rPr>
+              <a:t>EHCP Portal</a:t>
+            </a:r>
+          </a:p>
+        </p:txBody>
+      </p:sp>
+      <p:graphicFrame>
+        <p:nvGraphicFramePr>
+          <p:cNvPr id="12" name="Table 12">
+            <a:extLst>
+              <a:ext uri="{FF2B5EF4-FFF2-40B4-BE49-F238E27FC236}">
+                <a16:creationId xmlns:a16="http://schemas.microsoft.com/office/drawing/2014/main" id="{6FE6109B-9111-4A8B-BB7E-02C575970F95}"/>
+              </a:ext>
+            </a:extLst>
+          </p:cNvPr>
+          <p:cNvGraphicFramePr>
+            <a:graphicFrameLocks noGrp="1"/>
+          </p:cNvGraphicFramePr>
+          <p:nvPr>
+            <p:extLst>
+              <p:ext uri="{D42A27DB-BD31-4B8C-83A1-F6EECF244321}">
+                <p14:modId xmlns:p14="http://schemas.microsoft.com/office/powerpoint/2010/main" val="3688460667"/>
+              </p:ext>
+            </p:extLst>
+          </p:nvPr>
+        </p:nvGraphicFramePr>
+        <p:xfrm>
+          <a:off x="3742528" y="2914180"/>
+          <a:ext cx="6426200" cy="3360000"/>
+        </p:xfrm>
+        <a:graphic>
+          <a:graphicData uri="http://schemas.openxmlformats.org/drawingml/2006/table">
+            <a:tbl>
+              <a:tblPr firstRow="1" bandRow="1">
+                <a:tableStyleId>{93296810-A885-4BE3-A3E7-6D5BEEA58F35}</a:tableStyleId>
+              </a:tblPr>
+              <a:tblGrid>
+                <a:gridCol w="1285240">
+                  <a:extLst>
+                    <a:ext uri="{9D8B030D-6E8A-4147-A177-3AD203B41FA5}">
+                      <a16:colId xmlns:a16="http://schemas.microsoft.com/office/drawing/2014/main" val="3190566718"/>
+                    </a:ext>
+                  </a:extLst>
+                </a:gridCol>
+                <a:gridCol w="1285240">
+                  <a:extLst>
+                    <a:ext uri="{9D8B030D-6E8A-4147-A177-3AD203B41FA5}">
+                      <a16:colId xmlns:a16="http://schemas.microsoft.com/office/drawing/2014/main" val="1828269076"/>
+                    </a:ext>
+                  </a:extLst>
+                </a:gridCol>
+                <a:gridCol w="1285240">
+                  <a:extLst>
+                    <a:ext uri="{9D8B030D-6E8A-4147-A177-3AD203B41FA5}">
+                      <a16:colId xmlns:a16="http://schemas.microsoft.com/office/drawing/2014/main" val="761660790"/>
+                    </a:ext>
+                  </a:extLst>
+                </a:gridCol>
+                <a:gridCol w="1285240">
+                  <a:extLst>
+                    <a:ext uri="{9D8B030D-6E8A-4147-A177-3AD203B41FA5}">
+                      <a16:colId xmlns:a16="http://schemas.microsoft.com/office/drawing/2014/main" val="846711326"/>
+                    </a:ext>
+                  </a:extLst>
+                </a:gridCol>
+                <a:gridCol w="1285240">
+                  <a:extLst>
+                    <a:ext uri="{9D8B030D-6E8A-4147-A177-3AD203B41FA5}">
+                      <a16:colId xmlns:a16="http://schemas.microsoft.com/office/drawing/2014/main" val="65592039"/>
+                    </a:ext>
+                  </a:extLst>
+                </a:gridCol>
+              </a:tblGrid>
+              <a:tr h="336000">
+                <a:tc>
+                  <a:txBody>
+                    <a:bodyPr/>
+                    <a:lstStyle/>
+                    <a:p>
+                      <a:pPr algn="ctr"/>
+                      <a:r>
+                        <a:rPr lang="en-PH" sz="1600" dirty="0"/>
+                        <a:t>First Name</a:t>
+                      </a:r>
+                    </a:p>
+                  </a:txBody>
+                  <a:tcPr>
+                    <a:lnL w="12700" cap="flat" cmpd="sng" algn="ctr">
+                      <a:solidFill>
+                        <a:schemeClr val="tx1"/>
+                      </a:solidFill>
+                      <a:prstDash val="solid"/>
+                      <a:round/>
+                      <a:headEnd type="none" w="med" len="med"/>
+                      <a:tailEnd type="none" w="med" len="med"/>
+                    </a:lnL>
+                    <a:lnT w="12700" cap="flat" cmpd="sng" algn="ctr">
+                      <a:solidFill>
+                        <a:schemeClr val="tx1"/>
+                      </a:solidFill>
+                      <a:prstDash val="solid"/>
+                      <a:round/>
+                      <a:headEnd type="none" w="med" len="med"/>
+                      <a:tailEnd type="none" w="med" len="med"/>
+                    </a:lnT>
+                  </a:tcPr>
+                </a:tc>
+                <a:tc>
+                  <a:txBody>
+                    <a:bodyPr/>
+                    <a:lstStyle/>
+                    <a:p>
+                      <a:pPr algn="ctr"/>
+                      <a:r>
+                        <a:rPr lang="en-PH" sz="1600" dirty="0"/>
+                        <a:t>Last Name</a:t>
+                      </a:r>
+                    </a:p>
+                  </a:txBody>
+                  <a:tcPr>
+                    <a:lnT w="12700" cap="flat" cmpd="sng" algn="ctr">
+                      <a:solidFill>
+                        <a:schemeClr val="tx1"/>
+                      </a:solidFill>
+                      <a:prstDash val="solid"/>
+                      <a:round/>
+                      <a:headEnd type="none" w="med" len="med"/>
+                      <a:tailEnd type="none" w="med" len="med"/>
+                    </a:lnT>
+                  </a:tcPr>
+                </a:tc>
+                <a:tc>
+                  <a:txBody>
+                    <a:bodyPr/>
+                    <a:lstStyle/>
+                    <a:p>
+                      <a:pPr algn="ctr"/>
+                      <a:r>
+                        <a:rPr lang="en-PH" sz="1600" dirty="0"/>
+                        <a:t>Church</a:t>
+                      </a:r>
+                    </a:p>
+                  </a:txBody>
+                  <a:tcPr>
+                    <a:lnT w="12700" cap="flat" cmpd="sng" algn="ctr">
+                      <a:solidFill>
+                        <a:schemeClr val="tx1"/>
+                      </a:solidFill>
+                      <a:prstDash val="solid"/>
+                      <a:round/>
+                      <a:headEnd type="none" w="med" len="med"/>
+                      <a:tailEnd type="none" w="med" len="med"/>
+                    </a:lnT>
+                  </a:tcPr>
+                </a:tc>
+                <a:tc>
+                  <a:txBody>
+                    <a:bodyPr/>
+                    <a:lstStyle/>
+                    <a:p>
+                      <a:pPr algn="ctr"/>
+                      <a:r>
+                        <a:rPr lang="en-PH" sz="1600" dirty="0"/>
+                        <a:t>Mobile No.</a:t>
+                      </a:r>
+                    </a:p>
+                  </a:txBody>
+                  <a:tcPr>
+                    <a:lnT w="12700" cap="flat" cmpd="sng" algn="ctr">
+                      <a:solidFill>
+                        <a:schemeClr val="tx1"/>
+                      </a:solidFill>
+                      <a:prstDash val="solid"/>
+                      <a:round/>
+                      <a:headEnd type="none" w="med" len="med"/>
+                      <a:tailEnd type="none" w="med" len="med"/>
+                    </a:lnT>
+                  </a:tcPr>
+                </a:tc>
+                <a:tc>
+                  <a:txBody>
+                    <a:bodyPr/>
+                    <a:lstStyle/>
+                    <a:p>
+                      <a:pPr algn="ctr"/>
+                      <a:r>
+                        <a:rPr lang="en-PH" sz="1600" dirty="0"/>
+                        <a:t>Province</a:t>
+                      </a:r>
+                    </a:p>
+                  </a:txBody>
+                  <a:tcPr>
+                    <a:lnR w="12700" cap="flat" cmpd="sng" algn="ctr">
+                      <a:solidFill>
+                        <a:schemeClr val="tx1"/>
+                      </a:solidFill>
+                      <a:prstDash val="solid"/>
+                      <a:round/>
+                      <a:headEnd type="none" w="med" len="med"/>
+                      <a:tailEnd type="none" w="med" len="med"/>
+                    </a:lnR>
+                    <a:lnT w="12700" cap="flat" cmpd="sng" algn="ctr">
+                      <a:solidFill>
+                        <a:schemeClr val="tx1"/>
+                      </a:solidFill>
+                      <a:prstDash val="solid"/>
+                      <a:round/>
+                      <a:headEnd type="none" w="med" len="med"/>
+                      <a:tailEnd type="none" w="med" len="med"/>
+                    </a:lnT>
+                  </a:tcPr>
+                </a:tc>
+                <a:extLst>
+                  <a:ext uri="{0D108BD9-81ED-4DB2-BD59-A6C34878D82A}">
+                    <a16:rowId xmlns:a16="http://schemas.microsoft.com/office/drawing/2014/main" val="39302983"/>
+                  </a:ext>
+                </a:extLst>
+              </a:tr>
+              <a:tr h="336000">
+                <a:tc>
+                  <a:txBody>
+                    <a:bodyPr/>
+                    <a:lstStyle/>
+                    <a:p>
+                      <a:pPr algn="l"/>
+                      <a:r>
+                        <a:rPr lang="en-PH" sz="1600" dirty="0"/>
+                        <a:t>Frank</a:t>
+                      </a:r>
+                    </a:p>
+                  </a:txBody>
+                  <a:tcPr>
+                    <a:lnL w="12700" cap="flat" cmpd="sng" algn="ctr">
+                      <a:solidFill>
+                        <a:schemeClr val="tx1"/>
+                      </a:solidFill>
+                      <a:prstDash val="solid"/>
+                      <a:round/>
+                      <a:headEnd type="none" w="med" len="med"/>
+                      <a:tailEnd type="none" w="med" len="med"/>
+                    </a:lnL>
+                  </a:tcPr>
+                </a:tc>
+                <a:tc>
+                  <a:txBody>
+                    <a:bodyPr/>
+                    <a:lstStyle/>
+                    <a:p>
+                      <a:pPr algn="l"/>
+                      <a:r>
+                        <a:rPr lang="en-PH" sz="1600" dirty="0"/>
+                        <a:t>Sinatra</a:t>
+                      </a:r>
+                    </a:p>
+                  </a:txBody>
+                  <a:tcPr/>
+                </a:tc>
+                <a:tc>
+                  <a:txBody>
+                    <a:bodyPr/>
+                    <a:lstStyle/>
+                    <a:p>
+                      <a:pPr algn="l"/>
+                      <a:r>
+                        <a:rPr lang="en-PH" sz="1600" dirty="0"/>
+                        <a:t>AAA</a:t>
+                      </a:r>
+                    </a:p>
+                  </a:txBody>
+                  <a:tcPr/>
+                </a:tc>
+                <a:tc>
+                  <a:txBody>
+                    <a:bodyPr/>
+                    <a:lstStyle/>
+                    <a:p>
+                      <a:pPr algn="l"/>
+                      <a:r>
+                        <a:rPr lang="en-PH" sz="1600" dirty="0"/>
+                        <a:t>1234</a:t>
+                      </a:r>
+                    </a:p>
+                  </a:txBody>
+                  <a:tcPr/>
+                </a:tc>
+                <a:tc>
+                  <a:txBody>
+                    <a:bodyPr/>
+                    <a:lstStyle/>
+                    <a:p>
+                      <a:pPr algn="l"/>
+                      <a:r>
+                        <a:rPr lang="en-PH" sz="1600" dirty="0"/>
+                        <a:t>LAGUNA</a:t>
+                      </a:r>
+                    </a:p>
+                  </a:txBody>
+                  <a:tcPr>
+                    <a:lnR w="12700" cap="flat" cmpd="sng" algn="ctr">
+                      <a:solidFill>
+                        <a:schemeClr val="tx1"/>
+                      </a:solidFill>
+                      <a:prstDash val="solid"/>
+                      <a:round/>
+                      <a:headEnd type="none" w="med" len="med"/>
+                      <a:tailEnd type="none" w="med" len="med"/>
+                    </a:lnR>
+                  </a:tcPr>
+                </a:tc>
+                <a:extLst>
+                  <a:ext uri="{0D108BD9-81ED-4DB2-BD59-A6C34878D82A}">
+                    <a16:rowId xmlns:a16="http://schemas.microsoft.com/office/drawing/2014/main" val="3928132546"/>
+                  </a:ext>
+                </a:extLst>
+              </a:tr>
+              <a:tr h="336000">
+                <a:tc>
+                  <a:txBody>
+                    <a:bodyPr/>
+                    <a:lstStyle/>
+                    <a:p>
+                      <a:pPr algn="l"/>
+                      <a:r>
+                        <a:rPr lang="en-PH" sz="1600" dirty="0"/>
+                        <a:t>Joe</a:t>
+                      </a:r>
+                    </a:p>
+                  </a:txBody>
+                  <a:tcPr>
+                    <a:lnL w="12700" cap="flat" cmpd="sng" algn="ctr">
+                      <a:solidFill>
+                        <a:schemeClr val="tx1"/>
+                      </a:solidFill>
+                      <a:prstDash val="solid"/>
+                      <a:round/>
+                      <a:headEnd type="none" w="med" len="med"/>
+                      <a:tailEnd type="none" w="med" len="med"/>
+                    </a:lnL>
+                  </a:tcPr>
+                </a:tc>
+                <a:tc>
+                  <a:txBody>
+                    <a:bodyPr/>
+                    <a:lstStyle/>
+                    <a:p>
+                      <a:pPr algn="l"/>
+                      <a:r>
+                        <a:rPr lang="en-PH" sz="1600" dirty="0"/>
+                        <a:t>Biden</a:t>
+                      </a:r>
+                    </a:p>
+                  </a:txBody>
+                  <a:tcPr/>
+                </a:tc>
+                <a:tc>
+                  <a:txBody>
+                    <a:bodyPr/>
+                    <a:lstStyle/>
+                    <a:p>
+                      <a:pPr algn="l"/>
+                      <a:r>
+                        <a:rPr lang="en-PH" sz="1600" dirty="0"/>
+                        <a:t>BBB</a:t>
+                      </a:r>
+                    </a:p>
+                  </a:txBody>
+                  <a:tcPr/>
+                </a:tc>
+                <a:tc>
+                  <a:txBody>
+                    <a:bodyPr/>
+                    <a:lstStyle/>
+                    <a:p>
+                      <a:pPr algn="l"/>
+                      <a:r>
+                        <a:rPr lang="en-PH" sz="1600" dirty="0"/>
+                        <a:t>1234</a:t>
+                      </a:r>
+                    </a:p>
+                  </a:txBody>
+                  <a:tcPr/>
+                </a:tc>
+                <a:tc>
+                  <a:txBody>
+                    <a:bodyPr/>
+                    <a:lstStyle/>
+                    <a:p>
+                      <a:pPr algn="l"/>
+                      <a:r>
+                        <a:rPr lang="en-PH" sz="1600" dirty="0"/>
+                        <a:t>QUEZON</a:t>
+                      </a:r>
+                    </a:p>
+                  </a:txBody>
+                  <a:tcPr>
+                    <a:lnR w="12700" cap="flat" cmpd="sng" algn="ctr">
+                      <a:solidFill>
+                        <a:schemeClr val="tx1"/>
+                      </a:solidFill>
+                      <a:prstDash val="solid"/>
+                      <a:round/>
+                      <a:headEnd type="none" w="med" len="med"/>
+                      <a:tailEnd type="none" w="med" len="med"/>
+                    </a:lnR>
+                  </a:tcPr>
+                </a:tc>
+                <a:extLst>
+                  <a:ext uri="{0D108BD9-81ED-4DB2-BD59-A6C34878D82A}">
+                    <a16:rowId xmlns:a16="http://schemas.microsoft.com/office/drawing/2014/main" val="3053714809"/>
+                  </a:ext>
+                </a:extLst>
+              </a:tr>
+              <a:tr h="336000">
+                <a:tc>
+                  <a:txBody>
+                    <a:bodyPr/>
+                    <a:lstStyle/>
+                    <a:p>
+                      <a:pPr algn="l"/>
+                      <a:r>
+                        <a:rPr lang="en-PH" sz="1600" dirty="0"/>
+                        <a:t>Frank</a:t>
+                      </a:r>
+                    </a:p>
+                  </a:txBody>
+                  <a:tcPr>
+                    <a:lnL w="12700" cap="flat" cmpd="sng" algn="ctr">
+                      <a:solidFill>
+                        <a:schemeClr val="tx1"/>
+                      </a:solidFill>
+                      <a:prstDash val="solid"/>
+                      <a:round/>
+                      <a:headEnd type="none" w="med" len="med"/>
+                      <a:tailEnd type="none" w="med" len="med"/>
+                    </a:lnL>
+                  </a:tcPr>
+                </a:tc>
+                <a:tc>
+                  <a:txBody>
+                    <a:bodyPr/>
+                    <a:lstStyle/>
+                    <a:p>
+                      <a:pPr algn="l"/>
+                      <a:r>
+                        <a:rPr lang="en-PH" sz="1600" dirty="0"/>
+                        <a:t>Sinatra</a:t>
+                      </a:r>
+                    </a:p>
+                  </a:txBody>
+                  <a:tcPr/>
+                </a:tc>
+                <a:tc>
+                  <a:txBody>
+                    <a:bodyPr/>
+                    <a:lstStyle/>
+                    <a:p>
+                      <a:pPr algn="l"/>
+                      <a:r>
+                        <a:rPr lang="en-PH" sz="1600" dirty="0"/>
+                        <a:t>AAA</a:t>
+                      </a:r>
+                    </a:p>
+                  </a:txBody>
+                  <a:tcPr/>
+                </a:tc>
+                <a:tc>
+                  <a:txBody>
+                    <a:bodyPr/>
+                    <a:lstStyle/>
+                    <a:p>
+                      <a:pPr algn="l"/>
+                      <a:r>
+                        <a:rPr lang="en-PH" sz="1600" dirty="0"/>
+                        <a:t>1234</a:t>
+                      </a:r>
+                    </a:p>
+                  </a:txBody>
+                  <a:tcPr/>
+                </a:tc>
+                <a:tc>
+                  <a:txBody>
+                    <a:bodyPr/>
+                    <a:lstStyle/>
+                    <a:p>
+                      <a:pPr algn="l"/>
+                      <a:r>
+                        <a:rPr lang="en-PH" sz="1600" dirty="0"/>
+                        <a:t>LAGUNA</a:t>
+                      </a:r>
+                    </a:p>
+                  </a:txBody>
+                  <a:tcPr>
+                    <a:lnR w="12700" cap="flat" cmpd="sng" algn="ctr">
+                      <a:solidFill>
+                        <a:schemeClr val="tx1"/>
+                      </a:solidFill>
+                      <a:prstDash val="solid"/>
+                      <a:round/>
+                      <a:headEnd type="none" w="med" len="med"/>
+                      <a:tailEnd type="none" w="med" len="med"/>
+                    </a:lnR>
+                  </a:tcPr>
+                </a:tc>
+                <a:extLst>
+                  <a:ext uri="{0D108BD9-81ED-4DB2-BD59-A6C34878D82A}">
+                    <a16:rowId xmlns:a16="http://schemas.microsoft.com/office/drawing/2014/main" val="833276268"/>
+                  </a:ext>
+                </a:extLst>
+              </a:tr>
+              <a:tr h="336000">
+                <a:tc>
+                  <a:txBody>
+                    <a:bodyPr/>
+                    <a:lstStyle/>
+                    <a:p>
+                      <a:pPr algn="l"/>
+                      <a:r>
+                        <a:rPr lang="en-PH" sz="1600" dirty="0"/>
+                        <a:t>Joe</a:t>
+                      </a:r>
+                    </a:p>
+                  </a:txBody>
+                  <a:tcPr>
+                    <a:lnL w="12700" cap="flat" cmpd="sng" algn="ctr">
+                      <a:solidFill>
+                        <a:schemeClr val="tx1"/>
+                      </a:solidFill>
+                      <a:prstDash val="solid"/>
+                      <a:round/>
+                      <a:headEnd type="none" w="med" len="med"/>
+                      <a:tailEnd type="none" w="med" len="med"/>
+                    </a:lnL>
+                  </a:tcPr>
+                </a:tc>
+                <a:tc>
+                  <a:txBody>
+                    <a:bodyPr/>
+                    <a:lstStyle/>
+                    <a:p>
+                      <a:pPr algn="l"/>
+                      <a:r>
+                        <a:rPr lang="en-PH" sz="1600" dirty="0"/>
+                        <a:t>Biden</a:t>
+                      </a:r>
+                    </a:p>
+                  </a:txBody>
+                  <a:tcPr/>
+                </a:tc>
+                <a:tc>
+                  <a:txBody>
+                    <a:bodyPr/>
+                    <a:lstStyle/>
+                    <a:p>
+                      <a:pPr algn="l"/>
+                      <a:r>
+                        <a:rPr lang="en-PH" sz="1600" dirty="0"/>
+                        <a:t>BBB</a:t>
+                      </a:r>
+                    </a:p>
+                  </a:txBody>
+                  <a:tcPr/>
+                </a:tc>
+                <a:tc>
+                  <a:txBody>
+                    <a:bodyPr/>
+                    <a:lstStyle/>
+                    <a:p>
+                      <a:pPr algn="l"/>
+                      <a:r>
+                        <a:rPr lang="en-PH" sz="1600" dirty="0"/>
+                        <a:t>1234</a:t>
+                      </a:r>
+                    </a:p>
+                  </a:txBody>
+                  <a:tcPr/>
+                </a:tc>
+                <a:tc>
+                  <a:txBody>
+                    <a:bodyPr/>
+                    <a:lstStyle/>
+                    <a:p>
+                      <a:pPr algn="l"/>
+                      <a:r>
+                        <a:rPr lang="en-PH" sz="1600" dirty="0"/>
+                        <a:t>QUEZON</a:t>
+                      </a:r>
+                    </a:p>
+                  </a:txBody>
+                  <a:tcPr>
+                    <a:lnR w="12700" cap="flat" cmpd="sng" algn="ctr">
+                      <a:solidFill>
+                        <a:schemeClr val="tx1"/>
+                      </a:solidFill>
+                      <a:prstDash val="solid"/>
+                      <a:round/>
+                      <a:headEnd type="none" w="med" len="med"/>
+                      <a:tailEnd type="none" w="med" len="med"/>
+                    </a:lnR>
+                  </a:tcPr>
+                </a:tc>
+                <a:extLst>
+                  <a:ext uri="{0D108BD9-81ED-4DB2-BD59-A6C34878D82A}">
+                    <a16:rowId xmlns:a16="http://schemas.microsoft.com/office/drawing/2014/main" val="3752631754"/>
+                  </a:ext>
+                </a:extLst>
+              </a:tr>
+              <a:tr h="336000">
+                <a:tc>
+                  <a:txBody>
+                    <a:bodyPr/>
+                    <a:lstStyle/>
+                    <a:p>
+                      <a:pPr algn="l"/>
+                      <a:r>
+                        <a:rPr lang="en-PH" sz="1600" dirty="0"/>
+                        <a:t>Frank</a:t>
+                      </a:r>
+                    </a:p>
+                  </a:txBody>
+                  <a:tcPr>
+                    <a:lnL w="12700" cap="flat" cmpd="sng" algn="ctr">
+                      <a:solidFill>
+                        <a:schemeClr val="tx1"/>
+                      </a:solidFill>
+                      <a:prstDash val="solid"/>
+                      <a:round/>
+                      <a:headEnd type="none" w="med" len="med"/>
+                      <a:tailEnd type="none" w="med" len="med"/>
+                    </a:lnL>
+                  </a:tcPr>
+                </a:tc>
+                <a:tc>
+                  <a:txBody>
+                    <a:bodyPr/>
+                    <a:lstStyle/>
+                    <a:p>
+                      <a:pPr algn="l"/>
+                      <a:r>
+                        <a:rPr lang="en-PH" sz="1600" dirty="0"/>
+                        <a:t>Sinatra</a:t>
+                      </a:r>
+                    </a:p>
+                  </a:txBody>
+                  <a:tcPr/>
+                </a:tc>
+                <a:tc>
+                  <a:txBody>
+                    <a:bodyPr/>
+                    <a:lstStyle/>
+                    <a:p>
+                      <a:pPr algn="l"/>
+                      <a:r>
+                        <a:rPr lang="en-PH" sz="1600" dirty="0"/>
+                        <a:t>AAA</a:t>
+                      </a:r>
+                    </a:p>
+                  </a:txBody>
+                  <a:tcPr/>
+                </a:tc>
+                <a:tc>
+                  <a:txBody>
+                    <a:bodyPr/>
+                    <a:lstStyle/>
+                    <a:p>
+                      <a:pPr algn="l"/>
+                      <a:r>
+                        <a:rPr lang="en-PH" sz="1600" dirty="0"/>
+                        <a:t>1234</a:t>
+                      </a:r>
+                    </a:p>
+                  </a:txBody>
+                  <a:tcPr/>
+                </a:tc>
+                <a:tc>
+                  <a:txBody>
+                    <a:bodyPr/>
+                    <a:lstStyle/>
+                    <a:p>
+                      <a:pPr algn="l"/>
+                      <a:r>
+                        <a:rPr lang="en-PH" sz="1600" dirty="0"/>
+                        <a:t>LAGUNA</a:t>
+                      </a:r>
+                    </a:p>
+                  </a:txBody>
+                  <a:tcPr>
+                    <a:lnR w="12700" cap="flat" cmpd="sng" algn="ctr">
+                      <a:solidFill>
+                        <a:schemeClr val="tx1"/>
+                      </a:solidFill>
+                      <a:prstDash val="solid"/>
+                      <a:round/>
+                      <a:headEnd type="none" w="med" len="med"/>
+                      <a:tailEnd type="none" w="med" len="med"/>
+                    </a:lnR>
+                  </a:tcPr>
+                </a:tc>
+                <a:extLst>
+                  <a:ext uri="{0D108BD9-81ED-4DB2-BD59-A6C34878D82A}">
+                    <a16:rowId xmlns:a16="http://schemas.microsoft.com/office/drawing/2014/main" val="364557598"/>
+                  </a:ext>
+                </a:extLst>
+              </a:tr>
+              <a:tr h="336000">
+                <a:tc>
+                  <a:txBody>
+                    <a:bodyPr/>
+                    <a:lstStyle/>
+                    <a:p>
+                      <a:pPr algn="l"/>
+                      <a:r>
+                        <a:rPr lang="en-PH" sz="1600" dirty="0"/>
+                        <a:t>Joe</a:t>
+                      </a:r>
+                    </a:p>
+                  </a:txBody>
+                  <a:tcPr>
+                    <a:lnL w="12700" cap="flat" cmpd="sng" algn="ctr">
+                      <a:solidFill>
+                        <a:schemeClr val="tx1"/>
+                      </a:solidFill>
+                      <a:prstDash val="solid"/>
+                      <a:round/>
+                      <a:headEnd type="none" w="med" len="med"/>
+                      <a:tailEnd type="none" w="med" len="med"/>
+                    </a:lnL>
+                  </a:tcPr>
+                </a:tc>
+                <a:tc>
+                  <a:txBody>
+                    <a:bodyPr/>
+                    <a:lstStyle/>
+                    <a:p>
+                      <a:pPr algn="l"/>
+                      <a:r>
+                        <a:rPr lang="en-PH" sz="1600" dirty="0"/>
+                        <a:t>Biden</a:t>
+                      </a:r>
+                    </a:p>
+                  </a:txBody>
+                  <a:tcPr/>
+                </a:tc>
+                <a:tc>
+                  <a:txBody>
+                    <a:bodyPr/>
+                    <a:lstStyle/>
+                    <a:p>
+                      <a:pPr algn="l"/>
+                      <a:r>
+                        <a:rPr lang="en-PH" sz="1600" dirty="0"/>
+                        <a:t>BBB</a:t>
+                      </a:r>
+                    </a:p>
+                  </a:txBody>
+                  <a:tcPr/>
+                </a:tc>
+                <a:tc>
+                  <a:txBody>
+                    <a:bodyPr/>
+                    <a:lstStyle/>
+                    <a:p>
+                      <a:pPr algn="l"/>
+                      <a:r>
+                        <a:rPr lang="en-PH" sz="1600" dirty="0"/>
+                        <a:t>1234</a:t>
+                      </a:r>
+                    </a:p>
+                  </a:txBody>
+                  <a:tcPr/>
+                </a:tc>
+                <a:tc>
+                  <a:txBody>
+                    <a:bodyPr/>
+                    <a:lstStyle/>
+                    <a:p>
+                      <a:pPr algn="l"/>
+                      <a:r>
+                        <a:rPr lang="en-PH" sz="1600" dirty="0"/>
+                        <a:t>QUEZON</a:t>
+                      </a:r>
+                    </a:p>
+                  </a:txBody>
+                  <a:tcPr>
+                    <a:lnR w="12700" cap="flat" cmpd="sng" algn="ctr">
+                      <a:solidFill>
+                        <a:schemeClr val="tx1"/>
+                      </a:solidFill>
+                      <a:prstDash val="solid"/>
+                      <a:round/>
+                      <a:headEnd type="none" w="med" len="med"/>
+                      <a:tailEnd type="none" w="med" len="med"/>
+                    </a:lnR>
+                  </a:tcPr>
+                </a:tc>
+                <a:extLst>
+                  <a:ext uri="{0D108BD9-81ED-4DB2-BD59-A6C34878D82A}">
+                    <a16:rowId xmlns:a16="http://schemas.microsoft.com/office/drawing/2014/main" val="2399677492"/>
+                  </a:ext>
+                </a:extLst>
+              </a:tr>
+              <a:tr h="336000">
+                <a:tc>
+                  <a:txBody>
+                    <a:bodyPr/>
+                    <a:lstStyle/>
+                    <a:p>
+                      <a:pPr algn="l"/>
+                      <a:r>
+                        <a:rPr lang="en-PH" sz="1600" dirty="0"/>
+                        <a:t>Frank</a:t>
+                      </a:r>
+                    </a:p>
+                  </a:txBody>
+                  <a:tcPr>
+                    <a:lnL w="12700" cap="flat" cmpd="sng" algn="ctr">
+                      <a:solidFill>
+                        <a:schemeClr val="tx1"/>
+                      </a:solidFill>
+                      <a:prstDash val="solid"/>
+                      <a:round/>
+                      <a:headEnd type="none" w="med" len="med"/>
+                      <a:tailEnd type="none" w="med" len="med"/>
+                    </a:lnL>
+                  </a:tcPr>
+                </a:tc>
+                <a:tc>
+                  <a:txBody>
+                    <a:bodyPr/>
+                    <a:lstStyle/>
+                    <a:p>
+                      <a:pPr algn="l"/>
+                      <a:r>
+                        <a:rPr lang="en-PH" sz="1600" dirty="0"/>
+                        <a:t>Sinatra</a:t>
+                      </a:r>
+                    </a:p>
+                  </a:txBody>
+                  <a:tcPr/>
+                </a:tc>
+                <a:tc>
+                  <a:txBody>
+                    <a:bodyPr/>
+                    <a:lstStyle/>
+                    <a:p>
+                      <a:pPr algn="l"/>
+                      <a:r>
+                        <a:rPr lang="en-PH" sz="1600" dirty="0"/>
+                        <a:t>AAA</a:t>
+                      </a:r>
+                    </a:p>
+                  </a:txBody>
+                  <a:tcPr/>
+                </a:tc>
+                <a:tc>
+                  <a:txBody>
+                    <a:bodyPr/>
+                    <a:lstStyle/>
+                    <a:p>
+                      <a:pPr algn="l"/>
+                      <a:r>
+                        <a:rPr lang="en-PH" sz="1600" dirty="0"/>
+                        <a:t>1234</a:t>
+                      </a:r>
+                    </a:p>
+                  </a:txBody>
+                  <a:tcPr/>
+                </a:tc>
+                <a:tc>
+                  <a:txBody>
+                    <a:bodyPr/>
+                    <a:lstStyle/>
+                    <a:p>
+                      <a:pPr algn="l"/>
+                      <a:r>
+                        <a:rPr lang="en-PH" sz="1600" dirty="0"/>
+                        <a:t>LAGUNA</a:t>
+                      </a:r>
+                    </a:p>
+                  </a:txBody>
+                  <a:tcPr>
+                    <a:lnR w="12700" cap="flat" cmpd="sng" algn="ctr">
+                      <a:solidFill>
+                        <a:schemeClr val="tx1"/>
+                      </a:solidFill>
+                      <a:prstDash val="solid"/>
+                      <a:round/>
+                      <a:headEnd type="none" w="med" len="med"/>
+                      <a:tailEnd type="none" w="med" len="med"/>
+                    </a:lnR>
+                  </a:tcPr>
+                </a:tc>
+                <a:extLst>
+                  <a:ext uri="{0D108BD9-81ED-4DB2-BD59-A6C34878D82A}">
+                    <a16:rowId xmlns:a16="http://schemas.microsoft.com/office/drawing/2014/main" val="2798438267"/>
+                  </a:ext>
+                </a:extLst>
+              </a:tr>
+              <a:tr h="336000">
+                <a:tc>
+                  <a:txBody>
+                    <a:bodyPr/>
+                    <a:lstStyle/>
+                    <a:p>
+                      <a:pPr algn="l"/>
+                      <a:r>
+                        <a:rPr lang="en-PH" sz="1600" dirty="0"/>
+                        <a:t>Frank</a:t>
+                      </a:r>
+                    </a:p>
+                  </a:txBody>
+                  <a:tcPr>
+                    <a:lnL w="12700" cap="flat" cmpd="sng" algn="ctr">
+                      <a:solidFill>
+                        <a:schemeClr val="tx1"/>
+                      </a:solidFill>
+                      <a:prstDash val="solid"/>
+                      <a:round/>
+                      <a:headEnd type="none" w="med" len="med"/>
+                      <a:tailEnd type="none" w="med" len="med"/>
+                    </a:lnL>
+                  </a:tcPr>
+                </a:tc>
+                <a:tc>
+                  <a:txBody>
+                    <a:bodyPr/>
+                    <a:lstStyle/>
+                    <a:p>
+                      <a:pPr algn="l"/>
+                      <a:r>
+                        <a:rPr lang="en-PH" sz="1600" dirty="0"/>
+                        <a:t>Sinatra</a:t>
+                      </a:r>
+                    </a:p>
+                  </a:txBody>
+                  <a:tcPr/>
+                </a:tc>
+                <a:tc>
+                  <a:txBody>
+                    <a:bodyPr/>
+                    <a:lstStyle/>
+                    <a:p>
+                      <a:pPr algn="l"/>
+                      <a:r>
+                        <a:rPr lang="en-PH" sz="1600" dirty="0"/>
+                        <a:t>AAA</a:t>
+                      </a:r>
+                    </a:p>
+                  </a:txBody>
+                  <a:tcPr/>
+                </a:tc>
+                <a:tc>
+                  <a:txBody>
+                    <a:bodyPr/>
+                    <a:lstStyle/>
+                    <a:p>
+                      <a:pPr algn="l"/>
+                      <a:r>
+                        <a:rPr lang="en-PH" sz="1600" dirty="0"/>
+                        <a:t>1234</a:t>
+                      </a:r>
+                    </a:p>
+                  </a:txBody>
+                  <a:tcPr/>
+                </a:tc>
+                <a:tc>
+                  <a:txBody>
+                    <a:bodyPr/>
+                    <a:lstStyle/>
+                    <a:p>
+                      <a:pPr algn="l"/>
+                      <a:r>
+                        <a:rPr lang="en-PH" sz="1600" dirty="0"/>
+                        <a:t>LAGUNA</a:t>
+                      </a:r>
+                    </a:p>
+                  </a:txBody>
+                  <a:tcPr>
+                    <a:lnR w="12700" cap="flat" cmpd="sng" algn="ctr">
+                      <a:solidFill>
+                        <a:schemeClr val="tx1"/>
+                      </a:solidFill>
+                      <a:prstDash val="solid"/>
+                      <a:round/>
+                      <a:headEnd type="none" w="med" len="med"/>
+                      <a:tailEnd type="none" w="med" len="med"/>
+                    </a:lnR>
+                  </a:tcPr>
+                </a:tc>
+                <a:extLst>
+                  <a:ext uri="{0D108BD9-81ED-4DB2-BD59-A6C34878D82A}">
+                    <a16:rowId xmlns:a16="http://schemas.microsoft.com/office/drawing/2014/main" val="2884772308"/>
+                  </a:ext>
+                </a:extLst>
+              </a:tr>
+              <a:tr h="336000">
+                <a:tc>
+                  <a:txBody>
+                    <a:bodyPr/>
+                    <a:lstStyle/>
+                    <a:p>
+                      <a:pPr algn="l"/>
+                      <a:r>
+                        <a:rPr lang="en-PH" sz="1600" dirty="0"/>
+                        <a:t>Joe</a:t>
+                      </a:r>
+                    </a:p>
+                  </a:txBody>
+                  <a:tcPr>
+                    <a:lnL w="12700" cap="flat" cmpd="sng" algn="ctr">
+                      <a:solidFill>
+                        <a:schemeClr val="tx1"/>
+                      </a:solidFill>
+                      <a:prstDash val="solid"/>
+                      <a:round/>
+                      <a:headEnd type="none" w="med" len="med"/>
+                      <a:tailEnd type="none" w="med" len="med"/>
+                    </a:lnL>
+                    <a:lnB w="12700" cap="flat" cmpd="sng" algn="ctr">
+                      <a:solidFill>
+                        <a:schemeClr val="tx1"/>
+                      </a:solidFill>
+                      <a:prstDash val="solid"/>
+                      <a:round/>
+                      <a:headEnd type="none" w="med" len="med"/>
+                      <a:tailEnd type="none" w="med" len="med"/>
+                    </a:lnB>
+                  </a:tcPr>
+                </a:tc>
+                <a:tc>
+                  <a:txBody>
+                    <a:bodyPr/>
+                    <a:lstStyle/>
+                    <a:p>
+                      <a:pPr algn="l"/>
+                      <a:r>
+                        <a:rPr lang="en-PH" sz="1600" dirty="0"/>
+                        <a:t>Biden</a:t>
+                      </a:r>
+                    </a:p>
+                  </a:txBody>
+                  <a:tcPr>
+                    <a:lnB w="12700" cap="flat" cmpd="sng" algn="ctr">
+                      <a:solidFill>
+                        <a:schemeClr val="tx1"/>
+                      </a:solidFill>
+                      <a:prstDash val="solid"/>
+                      <a:round/>
+                      <a:headEnd type="none" w="med" len="med"/>
+                      <a:tailEnd type="none" w="med" len="med"/>
+                    </a:lnB>
+                  </a:tcPr>
+                </a:tc>
+                <a:tc>
+                  <a:txBody>
+                    <a:bodyPr/>
+                    <a:lstStyle/>
+                    <a:p>
+                      <a:pPr algn="l"/>
+                      <a:r>
+                        <a:rPr lang="en-PH" sz="1600" dirty="0"/>
+                        <a:t>BBB</a:t>
+                      </a:r>
+                    </a:p>
+                  </a:txBody>
+                  <a:tcPr>
+                    <a:lnB w="12700" cap="flat" cmpd="sng" algn="ctr">
+                      <a:solidFill>
+                        <a:schemeClr val="tx1"/>
+                      </a:solidFill>
+                      <a:prstDash val="solid"/>
+                      <a:round/>
+                      <a:headEnd type="none" w="med" len="med"/>
+                      <a:tailEnd type="none" w="med" len="med"/>
+                    </a:lnB>
+                  </a:tcPr>
+                </a:tc>
+                <a:tc>
+                  <a:txBody>
+                    <a:bodyPr/>
+                    <a:lstStyle/>
+                    <a:p>
+                      <a:pPr algn="l"/>
+                      <a:r>
+                        <a:rPr lang="en-PH" sz="1600" dirty="0"/>
+                        <a:t>1234</a:t>
+                      </a:r>
+                    </a:p>
+                  </a:txBody>
+                  <a:tcPr>
+                    <a:lnB w="12700" cap="flat" cmpd="sng" algn="ctr">
+                      <a:solidFill>
+                        <a:schemeClr val="tx1"/>
+                      </a:solidFill>
+                      <a:prstDash val="solid"/>
+                      <a:round/>
+                      <a:headEnd type="none" w="med" len="med"/>
+                      <a:tailEnd type="none" w="med" len="med"/>
+                    </a:lnB>
+                  </a:tcPr>
+                </a:tc>
+                <a:tc>
+                  <a:txBody>
+                    <a:bodyPr/>
+                    <a:lstStyle/>
+                    <a:p>
+                      <a:pPr algn="l"/>
+                      <a:r>
+                        <a:rPr lang="en-PH" sz="1600" dirty="0"/>
+                        <a:t>QUEZON</a:t>
+                      </a:r>
+                    </a:p>
+                  </a:txBody>
+                  <a:tcPr>
+                    <a:lnR w="12700" cap="flat" cmpd="sng" algn="ctr">
+                      <a:solidFill>
+                        <a:schemeClr val="tx1"/>
+                      </a:solidFill>
+                      <a:prstDash val="solid"/>
+                      <a:round/>
+                      <a:headEnd type="none" w="med" len="med"/>
+                      <a:tailEnd type="none" w="med" len="med"/>
+                    </a:lnR>
+                    <a:lnB w="12700" cap="flat" cmpd="sng" algn="ctr">
+                      <a:solidFill>
+                        <a:schemeClr val="tx1"/>
+                      </a:solidFill>
+                      <a:prstDash val="solid"/>
+                      <a:round/>
+                      <a:headEnd type="none" w="med" len="med"/>
+                      <a:tailEnd type="none" w="med" len="med"/>
+                    </a:lnB>
+                  </a:tcPr>
+                </a:tc>
+                <a:extLst>
+                  <a:ext uri="{0D108BD9-81ED-4DB2-BD59-A6C34878D82A}">
+                    <a16:rowId xmlns:a16="http://schemas.microsoft.com/office/drawing/2014/main" val="3863325476"/>
+                  </a:ext>
+                </a:extLst>
+              </a:tr>
+            </a:tbl>
+          </a:graphicData>
+        </a:graphic>
+      </p:graphicFrame>
+      <p:sp>
+        <p:nvSpPr>
+          <p:cNvPr id="14" name="Rectangle: Rounded Corners 13">
+            <a:extLst>
+              <a:ext uri="{FF2B5EF4-FFF2-40B4-BE49-F238E27FC236}">
+                <a16:creationId xmlns:a16="http://schemas.microsoft.com/office/drawing/2014/main" id="{00955EED-7DCB-47CC-AB46-BE03F361548B}"/>
+              </a:ext>
+            </a:extLst>
+          </p:cNvPr>
+          <p:cNvSpPr/>
+          <p:nvPr/>
+        </p:nvSpPr>
+        <p:spPr>
+          <a:xfrm>
+            <a:off x="8621708" y="2155124"/>
+            <a:ext cx="1443033" cy="342900"/>
+          </a:xfrm>
+          <a:prstGeom prst="roundRect">
+            <a:avLst/>
+          </a:prstGeom>
+          <a:solidFill>
+            <a:schemeClr val="accent6">
+              <a:lumMod val="60000"/>
+              <a:lumOff val="40000"/>
+            </a:schemeClr>
+          </a:solidFill>
+        </p:spPr>
+        <p:style>
+          <a:lnRef idx="2">
+            <a:schemeClr val="accent1">
+              <a:shade val="50000"/>
+            </a:schemeClr>
+          </a:lnRef>
+          <a:fillRef idx="1">
+            <a:schemeClr val="accent1"/>
+          </a:fillRef>
+          <a:effectRef idx="0">
+            <a:schemeClr val="accent1"/>
+          </a:effectRef>
+          <a:fontRef idx="minor">
+            <a:schemeClr val="lt1"/>
+          </a:fontRef>
+        </p:style>
+        <p:txBody>
+          <a:bodyPr rtlCol="0" anchor="ctr"/>
+          <a:lstStyle/>
+          <a:p>
+            <a:pPr algn="ctr"/>
+            <a:r>
+              <a:rPr lang="en-PH" sz="1400" dirty="0">
+                <a:solidFill>
+                  <a:sysClr val="windowText" lastClr="000000"/>
+                </a:solidFill>
+              </a:rPr>
+              <a:t>Filter</a:t>
+            </a:r>
+          </a:p>
+        </p:txBody>
+      </p:sp>
+      <p:sp>
+        <p:nvSpPr>
+          <p:cNvPr id="16" name="Rectangle 15">
+            <a:extLst>
+              <a:ext uri="{FF2B5EF4-FFF2-40B4-BE49-F238E27FC236}">
+                <a16:creationId xmlns:a16="http://schemas.microsoft.com/office/drawing/2014/main" id="{2ADDD6C2-481C-43C2-8CF0-9C1C56201181}"/>
+              </a:ext>
+            </a:extLst>
+          </p:cNvPr>
+          <p:cNvSpPr/>
+          <p:nvPr/>
+        </p:nvSpPr>
+        <p:spPr>
+          <a:xfrm>
+            <a:off x="3729827" y="1674201"/>
+            <a:ext cx="3309148" cy="323850"/>
+          </a:xfrm>
+          <a:prstGeom prst="rect">
+            <a:avLst/>
+          </a:prstGeom>
+          <a:solidFill>
+            <a:schemeClr val="bg1"/>
+          </a:solidFill>
+        </p:spPr>
+        <p:style>
+          <a:lnRef idx="2">
+            <a:schemeClr val="accent1">
+              <a:shade val="50000"/>
+            </a:schemeClr>
+          </a:lnRef>
+          <a:fillRef idx="1">
+            <a:schemeClr val="accent1"/>
+          </a:fillRef>
+          <a:effectRef idx="0">
+            <a:schemeClr val="accent1"/>
+          </a:effectRef>
+          <a:fontRef idx="minor">
+            <a:schemeClr val="lt1"/>
+          </a:fontRef>
+        </p:style>
+        <p:txBody>
+          <a:bodyPr rtlCol="0" anchor="ctr"/>
+          <a:lstStyle/>
+          <a:p>
+            <a:r>
+              <a:rPr lang="en-PH" sz="1400" i="1" dirty="0">
+                <a:solidFill>
+                  <a:schemeClr val="tx1"/>
+                </a:solidFill>
+              </a:rPr>
+              <a:t>First Name</a:t>
+            </a:r>
+          </a:p>
+        </p:txBody>
+      </p:sp>
+      <p:sp>
+        <p:nvSpPr>
+          <p:cNvPr id="19" name="Rectangle 18">
+            <a:extLst>
+              <a:ext uri="{FF2B5EF4-FFF2-40B4-BE49-F238E27FC236}">
+                <a16:creationId xmlns:a16="http://schemas.microsoft.com/office/drawing/2014/main" id="{DCCE076F-8A4F-41B2-9B51-4B2E3976D064}"/>
+              </a:ext>
+            </a:extLst>
+          </p:cNvPr>
+          <p:cNvSpPr/>
+          <p:nvPr/>
+        </p:nvSpPr>
+        <p:spPr>
+          <a:xfrm>
+            <a:off x="7115175" y="1674201"/>
+            <a:ext cx="3053553" cy="323850"/>
+          </a:xfrm>
+          <a:prstGeom prst="rect">
+            <a:avLst/>
+          </a:prstGeom>
+          <a:solidFill>
+            <a:schemeClr val="bg1"/>
+          </a:solidFill>
+        </p:spPr>
+        <p:style>
+          <a:lnRef idx="2">
+            <a:schemeClr val="accent1">
+              <a:shade val="50000"/>
+            </a:schemeClr>
+          </a:lnRef>
+          <a:fillRef idx="1">
+            <a:schemeClr val="accent1"/>
+          </a:fillRef>
+          <a:effectRef idx="0">
+            <a:schemeClr val="accent1"/>
+          </a:effectRef>
+          <a:fontRef idx="minor">
+            <a:schemeClr val="lt1"/>
+          </a:fontRef>
+        </p:style>
+        <p:txBody>
+          <a:bodyPr rtlCol="0" anchor="ctr"/>
+          <a:lstStyle/>
+          <a:p>
+            <a:r>
+              <a:rPr lang="en-PH" sz="1400" i="1" dirty="0">
+                <a:solidFill>
+                  <a:schemeClr val="tx1"/>
+                </a:solidFill>
+              </a:rPr>
+              <a:t>Last Name</a:t>
+            </a:r>
+          </a:p>
+        </p:txBody>
+      </p:sp>
+      <p:sp>
+        <p:nvSpPr>
+          <p:cNvPr id="20" name="Rectangle 19">
+            <a:extLst>
+              <a:ext uri="{FF2B5EF4-FFF2-40B4-BE49-F238E27FC236}">
+                <a16:creationId xmlns:a16="http://schemas.microsoft.com/office/drawing/2014/main" id="{00A59B7B-0768-493B-992B-9E48C0DA4CCE}"/>
+              </a:ext>
+            </a:extLst>
+          </p:cNvPr>
+          <p:cNvSpPr/>
+          <p:nvPr/>
+        </p:nvSpPr>
+        <p:spPr>
+          <a:xfrm>
+            <a:off x="3729827" y="2155124"/>
+            <a:ext cx="4722812" cy="323849"/>
+          </a:xfrm>
+          <a:prstGeom prst="rect">
+            <a:avLst/>
+          </a:prstGeom>
+          <a:solidFill>
+            <a:schemeClr val="bg1"/>
+          </a:solidFill>
+        </p:spPr>
+        <p:style>
+          <a:lnRef idx="2">
+            <a:schemeClr val="accent1">
+              <a:shade val="50000"/>
+            </a:schemeClr>
+          </a:lnRef>
+          <a:fillRef idx="1">
+            <a:schemeClr val="accent1"/>
+          </a:fillRef>
+          <a:effectRef idx="0">
+            <a:schemeClr val="accent1"/>
+          </a:effectRef>
+          <a:fontRef idx="minor">
+            <a:schemeClr val="lt1"/>
+          </a:fontRef>
+        </p:style>
+        <p:txBody>
+          <a:bodyPr rtlCol="0" anchor="ctr"/>
+          <a:lstStyle/>
+          <a:p>
+            <a:r>
+              <a:rPr lang="en-PH" sz="1400" i="1" dirty="0">
+                <a:solidFill>
+                  <a:schemeClr val="tx1"/>
+                </a:solidFill>
+              </a:rPr>
+              <a:t>Province</a:t>
+            </a:r>
+          </a:p>
+        </p:txBody>
+      </p:sp>
+      <p:sp>
+        <p:nvSpPr>
+          <p:cNvPr id="21" name="TextBox 20">
+            <a:extLst>
+              <a:ext uri="{FF2B5EF4-FFF2-40B4-BE49-F238E27FC236}">
+                <a16:creationId xmlns:a16="http://schemas.microsoft.com/office/drawing/2014/main" id="{9E873310-B4CF-4524-AA2F-FC490556E4BE}"/>
+              </a:ext>
+            </a:extLst>
+          </p:cNvPr>
+          <p:cNvSpPr txBox="1"/>
+          <p:nvPr/>
+        </p:nvSpPr>
+        <p:spPr>
+          <a:xfrm>
+            <a:off x="3729827" y="2516147"/>
+            <a:ext cx="1914525" cy="307777"/>
+          </a:xfrm>
+          <a:prstGeom prst="rect">
+            <a:avLst/>
+          </a:prstGeom>
+          <a:noFill/>
+        </p:spPr>
+        <p:txBody>
+          <a:bodyPr wrap="square" rtlCol="0">
+            <a:spAutoFit/>
+          </a:bodyPr>
+          <a:lstStyle/>
+          <a:p>
+            <a:r>
+              <a:rPr lang="en-PH" sz="1400" i="1" u="sng" dirty="0"/>
+              <a:t>More options</a:t>
+            </a:r>
           </a:p>
         </p:txBody>
       </p:sp>
     </p:spTree>
     <p:extLst>
       <p:ext uri="{BB962C8B-B14F-4D97-AF65-F5344CB8AC3E}">
-        <p14:creationId xmlns:p14="http://schemas.microsoft.com/office/powerpoint/2010/main" val="2817428263"/>
+        <p14:creationId xmlns:p14="http://schemas.microsoft.com/office/powerpoint/2010/main" val="3014177466"/>
+      </p:ext>
+    </p:extLst>
+  </p:cSld>
+  <p:clrMapOvr>
+    <a:masterClrMapping/>
+  </p:clrMapOvr>
+</p:sld>
+</file>
+
+<file path=ppt/slides/slide8.xml><?xml version="1.0" encoding="utf-8"?>
+<p:sld xmlns:a="http://schemas.openxmlformats.org/drawingml/2006/main" xmlns:r="http://schemas.openxmlformats.org/officeDocument/2006/relationships" xmlns:p="http://schemas.openxmlformats.org/presentationml/2006/main">
+  <p:cSld>
+    <p:spTree>
+      <p:nvGrpSpPr>
+        <p:cNvPr id="1" name=""/>
+        <p:cNvGrpSpPr/>
+        <p:nvPr/>
+      </p:nvGrpSpPr>
+      <p:grpSpPr>
+        <a:xfrm>
+          <a:off x="0" y="0"/>
+          <a:ext cx="0" cy="0"/>
+          <a:chOff x="0" y="0"/>
+          <a:chExt cx="0" cy="0"/>
+        </a:xfrm>
+      </p:grpSpPr>
+      <p:sp>
+        <p:nvSpPr>
+          <p:cNvPr id="2" name="Title 1">
+            <a:extLst>
+              <a:ext uri="{FF2B5EF4-FFF2-40B4-BE49-F238E27FC236}">
+                <a16:creationId xmlns:a16="http://schemas.microsoft.com/office/drawing/2014/main" id="{86F81A42-2F36-4E2B-82FA-1CB6171DEABC}"/>
+              </a:ext>
+            </a:extLst>
+          </p:cNvPr>
+          <p:cNvSpPr>
+            <a:spLocks noGrp="1"/>
+          </p:cNvSpPr>
+          <p:nvPr>
+            <p:ph type="title"/>
+          </p:nvPr>
+        </p:nvSpPr>
+        <p:spPr>
+          <a:xfrm>
+            <a:off x="838200" y="313392"/>
+            <a:ext cx="10515600" cy="1325563"/>
+          </a:xfrm>
+        </p:spPr>
+        <p:txBody>
+          <a:bodyPr/>
+          <a:lstStyle/>
+          <a:p>
+            <a:r>
+              <a:rPr lang="en-PH" dirty="0"/>
+              <a:t>Design</a:t>
+            </a:r>
+          </a:p>
+        </p:txBody>
+      </p:sp>
+      <p:sp>
+        <p:nvSpPr>
+          <p:cNvPr id="7" name="Rectangle 6">
+            <a:extLst>
+              <a:ext uri="{FF2B5EF4-FFF2-40B4-BE49-F238E27FC236}">
+                <a16:creationId xmlns:a16="http://schemas.microsoft.com/office/drawing/2014/main" id="{E0B1673C-F92B-4597-85A0-F12D766943FE}"/>
+              </a:ext>
+            </a:extLst>
+          </p:cNvPr>
+          <p:cNvSpPr/>
+          <p:nvPr/>
+        </p:nvSpPr>
+        <p:spPr>
+          <a:xfrm>
+            <a:off x="1343024" y="1362074"/>
+            <a:ext cx="2028825" cy="5130799"/>
+          </a:xfrm>
+          <a:prstGeom prst="rect">
+            <a:avLst/>
+          </a:prstGeom>
+          <a:solidFill>
+            <a:srgbClr val="92D050"/>
+          </a:solidFill>
+        </p:spPr>
+        <p:style>
+          <a:lnRef idx="2">
+            <a:schemeClr val="accent1">
+              <a:shade val="50000"/>
+            </a:schemeClr>
+          </a:lnRef>
+          <a:fillRef idx="1">
+            <a:schemeClr val="accent1"/>
+          </a:fillRef>
+          <a:effectRef idx="0">
+            <a:schemeClr val="accent1"/>
+          </a:effectRef>
+          <a:fontRef idx="minor">
+            <a:schemeClr val="lt1"/>
+          </a:fontRef>
+        </p:style>
+        <p:txBody>
+          <a:bodyPr rtlCol="0" anchor="ctr"/>
+          <a:lstStyle/>
+          <a:p>
+            <a:pPr algn="ctr"/>
+            <a:endParaRPr lang="en-PH" dirty="0"/>
+          </a:p>
+        </p:txBody>
+      </p:sp>
+      <p:sp>
+        <p:nvSpPr>
+          <p:cNvPr id="8" name="Rectangle: Rounded Corners 7">
+            <a:extLst>
+              <a:ext uri="{FF2B5EF4-FFF2-40B4-BE49-F238E27FC236}">
+                <a16:creationId xmlns:a16="http://schemas.microsoft.com/office/drawing/2014/main" id="{F98FA218-AD24-40CF-ACDC-BBFA6A4555DA}"/>
+              </a:ext>
+            </a:extLst>
+          </p:cNvPr>
+          <p:cNvSpPr/>
+          <p:nvPr/>
+        </p:nvSpPr>
+        <p:spPr>
+          <a:xfrm>
+            <a:off x="1512092" y="2508111"/>
+            <a:ext cx="1690688" cy="323851"/>
+          </a:xfrm>
+          <a:prstGeom prst="roundRect">
+            <a:avLst/>
+          </a:prstGeom>
+          <a:solidFill>
+            <a:schemeClr val="accent6">
+              <a:lumMod val="20000"/>
+              <a:lumOff val="80000"/>
+            </a:schemeClr>
+          </a:solidFill>
+        </p:spPr>
+        <p:style>
+          <a:lnRef idx="2">
+            <a:schemeClr val="accent1">
+              <a:shade val="50000"/>
+            </a:schemeClr>
+          </a:lnRef>
+          <a:fillRef idx="1">
+            <a:schemeClr val="accent1"/>
+          </a:fillRef>
+          <a:effectRef idx="0">
+            <a:schemeClr val="accent1"/>
+          </a:effectRef>
+          <a:fontRef idx="minor">
+            <a:schemeClr val="lt1"/>
+          </a:fontRef>
+        </p:style>
+        <p:txBody>
+          <a:bodyPr rtlCol="0" anchor="ctr"/>
+          <a:lstStyle/>
+          <a:p>
+            <a:pPr algn="ctr"/>
+            <a:r>
+              <a:rPr lang="en-PH" sz="1400" dirty="0">
+                <a:solidFill>
+                  <a:sysClr val="windowText" lastClr="000000"/>
+                </a:solidFill>
+              </a:rPr>
+              <a:t>Contacts</a:t>
+            </a:r>
+          </a:p>
+        </p:txBody>
+      </p:sp>
+      <p:sp>
+        <p:nvSpPr>
+          <p:cNvPr id="9" name="Rectangle: Rounded Corners 8">
+            <a:extLst>
+              <a:ext uri="{FF2B5EF4-FFF2-40B4-BE49-F238E27FC236}">
+                <a16:creationId xmlns:a16="http://schemas.microsoft.com/office/drawing/2014/main" id="{FF1DB019-DD0F-49C9-B305-9245CE4C5EBA}"/>
+              </a:ext>
+            </a:extLst>
+          </p:cNvPr>
+          <p:cNvSpPr/>
+          <p:nvPr/>
+        </p:nvSpPr>
+        <p:spPr>
+          <a:xfrm>
+            <a:off x="1509710" y="2914180"/>
+            <a:ext cx="1690688" cy="323852"/>
+          </a:xfrm>
+          <a:prstGeom prst="roundRect">
+            <a:avLst/>
+          </a:prstGeom>
+          <a:solidFill>
+            <a:schemeClr val="accent6">
+              <a:lumMod val="20000"/>
+              <a:lumOff val="80000"/>
+            </a:schemeClr>
+          </a:solidFill>
+        </p:spPr>
+        <p:style>
+          <a:lnRef idx="2">
+            <a:schemeClr val="accent1">
+              <a:shade val="50000"/>
+            </a:schemeClr>
+          </a:lnRef>
+          <a:fillRef idx="1">
+            <a:schemeClr val="accent1"/>
+          </a:fillRef>
+          <a:effectRef idx="0">
+            <a:schemeClr val="accent1"/>
+          </a:effectRef>
+          <a:fontRef idx="minor">
+            <a:schemeClr val="lt1"/>
+          </a:fontRef>
+        </p:style>
+        <p:txBody>
+          <a:bodyPr rtlCol="0" anchor="ctr"/>
+          <a:lstStyle/>
+          <a:p>
+            <a:pPr algn="ctr"/>
+            <a:r>
+              <a:rPr lang="en-PH" sz="1400" dirty="0">
+                <a:solidFill>
+                  <a:sysClr val="windowText" lastClr="000000"/>
+                </a:solidFill>
+              </a:rPr>
+              <a:t>Distribution</a:t>
+            </a:r>
+          </a:p>
+        </p:txBody>
+      </p:sp>
+      <p:sp>
+        <p:nvSpPr>
+          <p:cNvPr id="10" name="Rectangle: Rounded Corners 9">
+            <a:extLst>
+              <a:ext uri="{FF2B5EF4-FFF2-40B4-BE49-F238E27FC236}">
+                <a16:creationId xmlns:a16="http://schemas.microsoft.com/office/drawing/2014/main" id="{8F08CE64-735E-47B1-8A56-056AE563E142}"/>
+              </a:ext>
+            </a:extLst>
+          </p:cNvPr>
+          <p:cNvSpPr/>
+          <p:nvPr/>
+        </p:nvSpPr>
+        <p:spPr>
+          <a:xfrm>
+            <a:off x="1509710" y="3318993"/>
+            <a:ext cx="1690688" cy="323852"/>
+          </a:xfrm>
+          <a:prstGeom prst="roundRect">
+            <a:avLst/>
+          </a:prstGeom>
+          <a:solidFill>
+            <a:schemeClr val="accent6">
+              <a:lumMod val="20000"/>
+              <a:lumOff val="80000"/>
+            </a:schemeClr>
+          </a:solidFill>
+        </p:spPr>
+        <p:style>
+          <a:lnRef idx="2">
+            <a:schemeClr val="accent1">
+              <a:shade val="50000"/>
+            </a:schemeClr>
+          </a:lnRef>
+          <a:fillRef idx="1">
+            <a:schemeClr val="accent1"/>
+          </a:fillRef>
+          <a:effectRef idx="0">
+            <a:schemeClr val="accent1"/>
+          </a:effectRef>
+          <a:fontRef idx="minor">
+            <a:schemeClr val="lt1"/>
+          </a:fontRef>
+        </p:style>
+        <p:txBody>
+          <a:bodyPr rtlCol="0" anchor="ctr"/>
+          <a:lstStyle/>
+          <a:p>
+            <a:pPr algn="ctr"/>
+            <a:r>
+              <a:rPr lang="en-PH" sz="1400" dirty="0">
+                <a:solidFill>
+                  <a:sysClr val="windowText" lastClr="000000"/>
+                </a:solidFill>
+              </a:rPr>
+              <a:t>Events</a:t>
+            </a:r>
+          </a:p>
+        </p:txBody>
+      </p:sp>
+      <p:sp>
+        <p:nvSpPr>
+          <p:cNvPr id="11" name="TextBox 10">
+            <a:extLst>
+              <a:ext uri="{FF2B5EF4-FFF2-40B4-BE49-F238E27FC236}">
+                <a16:creationId xmlns:a16="http://schemas.microsoft.com/office/drawing/2014/main" id="{F2599194-867C-4499-A9BB-8AEEDEB055C6}"/>
+              </a:ext>
+            </a:extLst>
+          </p:cNvPr>
+          <p:cNvSpPr txBox="1"/>
+          <p:nvPr/>
+        </p:nvSpPr>
+        <p:spPr>
+          <a:xfrm>
+            <a:off x="1512092" y="1581150"/>
+            <a:ext cx="1690688" cy="707886"/>
+          </a:xfrm>
+          <a:prstGeom prst="rect">
+            <a:avLst/>
+          </a:prstGeom>
+          <a:noFill/>
+        </p:spPr>
+        <p:txBody>
+          <a:bodyPr wrap="square" rtlCol="0">
+            <a:spAutoFit/>
+          </a:bodyPr>
+          <a:lstStyle/>
+          <a:p>
+            <a:pPr algn="ctr"/>
+            <a:r>
+              <a:rPr lang="en-PH" sz="2000" b="1" dirty="0">
+                <a:latin typeface="Arial Black" panose="020B0A04020102020204" pitchFamily="34" charset="0"/>
+              </a:rPr>
+              <a:t>EHCP Portal</a:t>
+            </a:r>
+          </a:p>
+        </p:txBody>
+      </p:sp>
+      <p:sp>
+        <p:nvSpPr>
+          <p:cNvPr id="15" name="Rectangle 14">
+            <a:extLst>
+              <a:ext uri="{FF2B5EF4-FFF2-40B4-BE49-F238E27FC236}">
+                <a16:creationId xmlns:a16="http://schemas.microsoft.com/office/drawing/2014/main" id="{1326651B-04D7-44E1-A7FA-8798B5210A3F}"/>
+              </a:ext>
+            </a:extLst>
+          </p:cNvPr>
+          <p:cNvSpPr/>
+          <p:nvPr/>
+        </p:nvSpPr>
+        <p:spPr>
+          <a:xfrm>
+            <a:off x="3876676" y="1362074"/>
+            <a:ext cx="2028825" cy="5130799"/>
+          </a:xfrm>
+          <a:prstGeom prst="rect">
+            <a:avLst/>
+          </a:prstGeom>
+          <a:solidFill>
+            <a:srgbClr val="92D050"/>
+          </a:solidFill>
+        </p:spPr>
+        <p:style>
+          <a:lnRef idx="2">
+            <a:schemeClr val="accent1">
+              <a:shade val="50000"/>
+            </a:schemeClr>
+          </a:lnRef>
+          <a:fillRef idx="1">
+            <a:schemeClr val="accent1"/>
+          </a:fillRef>
+          <a:effectRef idx="0">
+            <a:schemeClr val="accent1"/>
+          </a:effectRef>
+          <a:fontRef idx="minor">
+            <a:schemeClr val="lt1"/>
+          </a:fontRef>
+        </p:style>
+        <p:txBody>
+          <a:bodyPr rtlCol="0" anchor="ctr"/>
+          <a:lstStyle/>
+          <a:p>
+            <a:pPr algn="ctr"/>
+            <a:endParaRPr lang="en-PH" dirty="0"/>
+          </a:p>
+        </p:txBody>
+      </p:sp>
+      <p:sp>
+        <p:nvSpPr>
+          <p:cNvPr id="22" name="TextBox 21">
+            <a:extLst>
+              <a:ext uri="{FF2B5EF4-FFF2-40B4-BE49-F238E27FC236}">
+                <a16:creationId xmlns:a16="http://schemas.microsoft.com/office/drawing/2014/main" id="{837E83FB-C609-45AF-8B25-E737834B1E81}"/>
+              </a:ext>
+            </a:extLst>
+          </p:cNvPr>
+          <p:cNvSpPr txBox="1"/>
+          <p:nvPr/>
+        </p:nvSpPr>
+        <p:spPr>
+          <a:xfrm>
+            <a:off x="4045744" y="1581150"/>
+            <a:ext cx="1690688" cy="707886"/>
+          </a:xfrm>
+          <a:prstGeom prst="rect">
+            <a:avLst/>
+          </a:prstGeom>
+          <a:noFill/>
+        </p:spPr>
+        <p:txBody>
+          <a:bodyPr wrap="square" rtlCol="0">
+            <a:spAutoFit/>
+          </a:bodyPr>
+          <a:lstStyle/>
+          <a:p>
+            <a:pPr algn="ctr"/>
+            <a:r>
+              <a:rPr lang="en-PH" sz="2000" b="1" dirty="0">
+                <a:latin typeface="Arial Black" panose="020B0A04020102020204" pitchFamily="34" charset="0"/>
+              </a:rPr>
+              <a:t>EHCP Portal</a:t>
+            </a:r>
+          </a:p>
+        </p:txBody>
+      </p:sp>
+      <p:sp>
+        <p:nvSpPr>
+          <p:cNvPr id="3" name="Rectangle 2">
+            <a:extLst>
+              <a:ext uri="{FF2B5EF4-FFF2-40B4-BE49-F238E27FC236}">
+                <a16:creationId xmlns:a16="http://schemas.microsoft.com/office/drawing/2014/main" id="{5E8A9438-5349-438B-9CE5-6597F973817F}"/>
+              </a:ext>
+            </a:extLst>
+          </p:cNvPr>
+          <p:cNvSpPr/>
+          <p:nvPr/>
+        </p:nvSpPr>
+        <p:spPr>
+          <a:xfrm>
+            <a:off x="3876676" y="2508111"/>
+            <a:ext cx="2028825" cy="323851"/>
+          </a:xfrm>
+          <a:prstGeom prst="rect">
+            <a:avLst/>
+          </a:prstGeom>
+          <a:solidFill>
+            <a:schemeClr val="accent6">
+              <a:lumMod val="20000"/>
+              <a:lumOff val="80000"/>
+            </a:schemeClr>
+          </a:solidFill>
+          <a:ln>
+            <a:solidFill>
+              <a:schemeClr val="accent6">
+                <a:lumMod val="75000"/>
+              </a:schemeClr>
+            </a:solidFill>
+          </a:ln>
+        </p:spPr>
+        <p:style>
+          <a:lnRef idx="2">
+            <a:schemeClr val="accent1">
+              <a:shade val="50000"/>
+            </a:schemeClr>
+          </a:lnRef>
+          <a:fillRef idx="1">
+            <a:schemeClr val="accent1"/>
+          </a:fillRef>
+          <a:effectRef idx="0">
+            <a:schemeClr val="accent1"/>
+          </a:effectRef>
+          <a:fontRef idx="minor">
+            <a:schemeClr val="lt1"/>
+          </a:fontRef>
+        </p:style>
+        <p:txBody>
+          <a:bodyPr rtlCol="0" anchor="ctr"/>
+          <a:lstStyle/>
+          <a:p>
+            <a:r>
+              <a:rPr lang="en-PH" sz="1400" dirty="0">
+                <a:solidFill>
+                  <a:sysClr val="windowText" lastClr="000000"/>
+                </a:solidFill>
+              </a:rPr>
+              <a:t>  Contacts &gt;</a:t>
+            </a:r>
+            <a:endParaRPr lang="en-PH" dirty="0"/>
+          </a:p>
+        </p:txBody>
+      </p:sp>
+      <p:sp>
+        <p:nvSpPr>
+          <p:cNvPr id="23" name="Rectangle 22">
+            <a:extLst>
+              <a:ext uri="{FF2B5EF4-FFF2-40B4-BE49-F238E27FC236}">
+                <a16:creationId xmlns:a16="http://schemas.microsoft.com/office/drawing/2014/main" id="{154E1A70-0350-4FAE-9A16-1FBAA3349A8D}"/>
+              </a:ext>
+            </a:extLst>
+          </p:cNvPr>
+          <p:cNvSpPr/>
+          <p:nvPr/>
+        </p:nvSpPr>
+        <p:spPr>
+          <a:xfrm>
+            <a:off x="3876676" y="2831962"/>
+            <a:ext cx="2028825" cy="531957"/>
+          </a:xfrm>
+          <a:prstGeom prst="rect">
+            <a:avLst/>
+          </a:prstGeom>
+          <a:solidFill>
+            <a:schemeClr val="accent6">
+              <a:lumMod val="60000"/>
+              <a:lumOff val="40000"/>
+            </a:schemeClr>
+          </a:solidFill>
+          <a:ln>
+            <a:noFill/>
+          </a:ln>
+        </p:spPr>
+        <p:style>
+          <a:lnRef idx="2">
+            <a:schemeClr val="accent1">
+              <a:shade val="50000"/>
+            </a:schemeClr>
+          </a:lnRef>
+          <a:fillRef idx="1">
+            <a:schemeClr val="accent1"/>
+          </a:fillRef>
+          <a:effectRef idx="0">
+            <a:schemeClr val="accent1"/>
+          </a:effectRef>
+          <a:fontRef idx="minor">
+            <a:schemeClr val="lt1"/>
+          </a:fontRef>
+        </p:style>
+        <p:txBody>
+          <a:bodyPr rtlCol="0" anchor="ctr"/>
+          <a:lstStyle/>
+          <a:p>
+            <a:r>
+              <a:rPr lang="en-PH" sz="1400" dirty="0">
+                <a:solidFill>
+                  <a:sysClr val="windowText" lastClr="000000"/>
+                </a:solidFill>
+              </a:rPr>
+              <a:t>    Add new contact</a:t>
+            </a:r>
+          </a:p>
+          <a:p>
+            <a:r>
+              <a:rPr lang="en-PH" sz="1400" dirty="0">
+                <a:solidFill>
+                  <a:sysClr val="windowText" lastClr="000000"/>
+                </a:solidFill>
+              </a:rPr>
+              <a:t>    Search contact</a:t>
+            </a:r>
+            <a:endParaRPr lang="en-PH" dirty="0"/>
+          </a:p>
+        </p:txBody>
+      </p:sp>
+      <p:sp>
+        <p:nvSpPr>
+          <p:cNvPr id="25" name="Rectangle 24">
+            <a:extLst>
+              <a:ext uri="{FF2B5EF4-FFF2-40B4-BE49-F238E27FC236}">
+                <a16:creationId xmlns:a16="http://schemas.microsoft.com/office/drawing/2014/main" id="{90164C02-CB32-4FF5-B45F-80C1CD1B0CC2}"/>
+              </a:ext>
+            </a:extLst>
+          </p:cNvPr>
+          <p:cNvSpPr/>
+          <p:nvPr/>
+        </p:nvSpPr>
+        <p:spPr>
+          <a:xfrm>
+            <a:off x="3876673" y="3363919"/>
+            <a:ext cx="2028825" cy="323851"/>
+          </a:xfrm>
+          <a:prstGeom prst="rect">
+            <a:avLst/>
+          </a:prstGeom>
+          <a:solidFill>
+            <a:schemeClr val="accent6">
+              <a:lumMod val="20000"/>
+              <a:lumOff val="80000"/>
+            </a:schemeClr>
+          </a:solidFill>
+          <a:ln>
+            <a:solidFill>
+              <a:schemeClr val="accent6">
+                <a:lumMod val="75000"/>
+              </a:schemeClr>
+            </a:solidFill>
+          </a:ln>
+        </p:spPr>
+        <p:style>
+          <a:lnRef idx="2">
+            <a:schemeClr val="accent1">
+              <a:shade val="50000"/>
+            </a:schemeClr>
+          </a:lnRef>
+          <a:fillRef idx="1">
+            <a:schemeClr val="accent1"/>
+          </a:fillRef>
+          <a:effectRef idx="0">
+            <a:schemeClr val="accent1"/>
+          </a:effectRef>
+          <a:fontRef idx="minor">
+            <a:schemeClr val="lt1"/>
+          </a:fontRef>
+        </p:style>
+        <p:txBody>
+          <a:bodyPr rtlCol="0" anchor="ctr"/>
+          <a:lstStyle/>
+          <a:p>
+            <a:r>
+              <a:rPr lang="en-PH" sz="1400" dirty="0">
+                <a:solidFill>
+                  <a:sysClr val="windowText" lastClr="000000"/>
+                </a:solidFill>
+              </a:rPr>
+              <a:t>  Distributions &gt;</a:t>
+            </a:r>
+            <a:endParaRPr lang="en-PH" dirty="0"/>
+          </a:p>
+        </p:txBody>
+      </p:sp>
+      <p:sp>
+        <p:nvSpPr>
+          <p:cNvPr id="26" name="Rectangle 25">
+            <a:extLst>
+              <a:ext uri="{FF2B5EF4-FFF2-40B4-BE49-F238E27FC236}">
+                <a16:creationId xmlns:a16="http://schemas.microsoft.com/office/drawing/2014/main" id="{3A663A73-8F7D-45E5-B99C-5E04C1BD3864}"/>
+              </a:ext>
+            </a:extLst>
+          </p:cNvPr>
+          <p:cNvSpPr/>
+          <p:nvPr/>
+        </p:nvSpPr>
+        <p:spPr>
+          <a:xfrm>
+            <a:off x="3876673" y="3701118"/>
+            <a:ext cx="2028825" cy="531957"/>
+          </a:xfrm>
+          <a:prstGeom prst="rect">
+            <a:avLst/>
+          </a:prstGeom>
+          <a:solidFill>
+            <a:schemeClr val="accent6">
+              <a:lumMod val="60000"/>
+              <a:lumOff val="40000"/>
+            </a:schemeClr>
+          </a:solidFill>
+          <a:ln>
+            <a:noFill/>
+          </a:ln>
+        </p:spPr>
+        <p:style>
+          <a:lnRef idx="2">
+            <a:schemeClr val="accent1">
+              <a:shade val="50000"/>
+            </a:schemeClr>
+          </a:lnRef>
+          <a:fillRef idx="1">
+            <a:schemeClr val="accent1"/>
+          </a:fillRef>
+          <a:effectRef idx="0">
+            <a:schemeClr val="accent1"/>
+          </a:effectRef>
+          <a:fontRef idx="minor">
+            <a:schemeClr val="lt1"/>
+          </a:fontRef>
+        </p:style>
+        <p:txBody>
+          <a:bodyPr rtlCol="0" anchor="ctr"/>
+          <a:lstStyle/>
+          <a:p>
+            <a:r>
+              <a:rPr lang="en-PH" sz="1400" dirty="0">
+                <a:solidFill>
+                  <a:sysClr val="windowText" lastClr="000000"/>
+                </a:solidFill>
+              </a:rPr>
+              <a:t>    Add new request</a:t>
+            </a:r>
+          </a:p>
+          <a:p>
+            <a:r>
+              <a:rPr lang="en-PH" sz="1400" dirty="0">
+                <a:solidFill>
+                  <a:sysClr val="windowText" lastClr="000000"/>
+                </a:solidFill>
+              </a:rPr>
+              <a:t>    Search request</a:t>
+            </a:r>
+            <a:endParaRPr lang="en-PH" dirty="0"/>
+          </a:p>
+        </p:txBody>
+      </p:sp>
+      <p:sp>
+        <p:nvSpPr>
+          <p:cNvPr id="28" name="Rectangle 27">
+            <a:extLst>
+              <a:ext uri="{FF2B5EF4-FFF2-40B4-BE49-F238E27FC236}">
+                <a16:creationId xmlns:a16="http://schemas.microsoft.com/office/drawing/2014/main" id="{3DA7C8F4-E7EE-44F0-8CCC-DABC3D691561}"/>
+              </a:ext>
+            </a:extLst>
+          </p:cNvPr>
+          <p:cNvSpPr/>
+          <p:nvPr/>
+        </p:nvSpPr>
+        <p:spPr>
+          <a:xfrm>
+            <a:off x="3876673" y="4211334"/>
+            <a:ext cx="2028825" cy="323851"/>
+          </a:xfrm>
+          <a:prstGeom prst="rect">
+            <a:avLst/>
+          </a:prstGeom>
+          <a:solidFill>
+            <a:schemeClr val="accent6">
+              <a:lumMod val="20000"/>
+              <a:lumOff val="80000"/>
+            </a:schemeClr>
+          </a:solidFill>
+          <a:ln>
+            <a:solidFill>
+              <a:schemeClr val="accent6">
+                <a:lumMod val="75000"/>
+              </a:schemeClr>
+            </a:solidFill>
+          </a:ln>
+        </p:spPr>
+        <p:style>
+          <a:lnRef idx="2">
+            <a:schemeClr val="accent1">
+              <a:shade val="50000"/>
+            </a:schemeClr>
+          </a:lnRef>
+          <a:fillRef idx="1">
+            <a:schemeClr val="accent1"/>
+          </a:fillRef>
+          <a:effectRef idx="0">
+            <a:schemeClr val="accent1"/>
+          </a:effectRef>
+          <a:fontRef idx="minor">
+            <a:schemeClr val="lt1"/>
+          </a:fontRef>
+        </p:style>
+        <p:txBody>
+          <a:bodyPr rtlCol="0" anchor="ctr"/>
+          <a:lstStyle/>
+          <a:p>
+            <a:r>
+              <a:rPr lang="en-PH" sz="1400" dirty="0">
+                <a:solidFill>
+                  <a:sysClr val="windowText" lastClr="000000"/>
+                </a:solidFill>
+              </a:rPr>
+              <a:t>  Events &gt;</a:t>
+            </a:r>
+            <a:endParaRPr lang="en-PH" dirty="0"/>
+          </a:p>
+        </p:txBody>
+      </p:sp>
+      <p:sp>
+        <p:nvSpPr>
+          <p:cNvPr id="29" name="Rectangle 28">
+            <a:extLst>
+              <a:ext uri="{FF2B5EF4-FFF2-40B4-BE49-F238E27FC236}">
+                <a16:creationId xmlns:a16="http://schemas.microsoft.com/office/drawing/2014/main" id="{B8BC71A5-9277-4F17-A870-B1C1A8F1ACEC}"/>
+              </a:ext>
+            </a:extLst>
+          </p:cNvPr>
+          <p:cNvSpPr/>
+          <p:nvPr/>
+        </p:nvSpPr>
+        <p:spPr>
+          <a:xfrm>
+            <a:off x="3876673" y="4548533"/>
+            <a:ext cx="2028825" cy="531957"/>
+          </a:xfrm>
+          <a:prstGeom prst="rect">
+            <a:avLst/>
+          </a:prstGeom>
+          <a:solidFill>
+            <a:schemeClr val="accent6">
+              <a:lumMod val="60000"/>
+              <a:lumOff val="40000"/>
+            </a:schemeClr>
+          </a:solidFill>
+          <a:ln>
+            <a:noFill/>
+          </a:ln>
+        </p:spPr>
+        <p:style>
+          <a:lnRef idx="2">
+            <a:schemeClr val="accent1">
+              <a:shade val="50000"/>
+            </a:schemeClr>
+          </a:lnRef>
+          <a:fillRef idx="1">
+            <a:schemeClr val="accent1"/>
+          </a:fillRef>
+          <a:effectRef idx="0">
+            <a:schemeClr val="accent1"/>
+          </a:effectRef>
+          <a:fontRef idx="minor">
+            <a:schemeClr val="lt1"/>
+          </a:fontRef>
+        </p:style>
+        <p:txBody>
+          <a:bodyPr rtlCol="0" anchor="ctr"/>
+          <a:lstStyle/>
+          <a:p>
+            <a:r>
+              <a:rPr lang="en-PH" sz="1400" dirty="0">
+                <a:solidFill>
+                  <a:sysClr val="windowText" lastClr="000000"/>
+                </a:solidFill>
+              </a:rPr>
+              <a:t>    Add new event</a:t>
+            </a:r>
+          </a:p>
+          <a:p>
+            <a:r>
+              <a:rPr lang="en-PH" sz="1400" dirty="0">
+                <a:solidFill>
+                  <a:sysClr val="windowText" lastClr="000000"/>
+                </a:solidFill>
+              </a:rPr>
+              <a:t>    Search event</a:t>
+            </a:r>
+            <a:endParaRPr lang="en-PH" dirty="0"/>
+          </a:p>
+        </p:txBody>
+      </p:sp>
+    </p:spTree>
+    <p:extLst>
+      <p:ext uri="{BB962C8B-B14F-4D97-AF65-F5344CB8AC3E}">
+        <p14:creationId xmlns:p14="http://schemas.microsoft.com/office/powerpoint/2010/main" val="1526102288"/>
       </p:ext>
     </p:extLst>
   </p:cSld>

</xml_diff>